<commit_message>
verhaal deels uitgetypt + voortgang presentatie
</commit_message>
<xml_diff>
--- a/presentation/Scaling Learning to Rank to Big data.pptx
+++ b/presentation/Scaling Learning to Rank to Big data.pptx
@@ -5,35 +5,38 @@
     <p:sldMasterId id="2147483648" r:id="rId1"/>
   </p:sldMasterIdLst>
   <p:notesMasterIdLst>
-    <p:notesMasterId r:id="rId28"/>
+    <p:notesMasterId r:id="rId31"/>
   </p:notesMasterIdLst>
   <p:sldIdLst>
     <p:sldId id="256" r:id="rId2"/>
-    <p:sldId id="257" r:id="rId3"/>
-    <p:sldId id="276" r:id="rId4"/>
-    <p:sldId id="277" r:id="rId5"/>
-    <p:sldId id="278" r:id="rId6"/>
-    <p:sldId id="279" r:id="rId7"/>
-    <p:sldId id="280" r:id="rId8"/>
-    <p:sldId id="281" r:id="rId9"/>
-    <p:sldId id="263" r:id="rId10"/>
-    <p:sldId id="264" r:id="rId11"/>
-    <p:sldId id="265" r:id="rId12"/>
-    <p:sldId id="266" r:id="rId13"/>
-    <p:sldId id="268" r:id="rId14"/>
-    <p:sldId id="269" r:id="rId15"/>
-    <p:sldId id="270" r:id="rId16"/>
-    <p:sldId id="271" r:id="rId17"/>
-    <p:sldId id="272" r:id="rId18"/>
-    <p:sldId id="273" r:id="rId19"/>
-    <p:sldId id="274" r:id="rId20"/>
-    <p:sldId id="275" r:id="rId21"/>
-    <p:sldId id="282" r:id="rId22"/>
-    <p:sldId id="283" r:id="rId23"/>
-    <p:sldId id="284" r:id="rId24"/>
-    <p:sldId id="285" r:id="rId25"/>
-    <p:sldId id="286" r:id="rId26"/>
-    <p:sldId id="287" r:id="rId27"/>
+    <p:sldId id="288" r:id="rId3"/>
+    <p:sldId id="291" r:id="rId4"/>
+    <p:sldId id="290" r:id="rId5"/>
+    <p:sldId id="257" r:id="rId6"/>
+    <p:sldId id="276" r:id="rId7"/>
+    <p:sldId id="277" r:id="rId8"/>
+    <p:sldId id="278" r:id="rId9"/>
+    <p:sldId id="279" r:id="rId10"/>
+    <p:sldId id="280" r:id="rId11"/>
+    <p:sldId id="281" r:id="rId12"/>
+    <p:sldId id="263" r:id="rId13"/>
+    <p:sldId id="264" r:id="rId14"/>
+    <p:sldId id="265" r:id="rId15"/>
+    <p:sldId id="266" r:id="rId16"/>
+    <p:sldId id="268" r:id="rId17"/>
+    <p:sldId id="269" r:id="rId18"/>
+    <p:sldId id="270" r:id="rId19"/>
+    <p:sldId id="271" r:id="rId20"/>
+    <p:sldId id="272" r:id="rId21"/>
+    <p:sldId id="273" r:id="rId22"/>
+    <p:sldId id="274" r:id="rId23"/>
+    <p:sldId id="275" r:id="rId24"/>
+    <p:sldId id="282" r:id="rId25"/>
+    <p:sldId id="283" r:id="rId26"/>
+    <p:sldId id="284" r:id="rId27"/>
+    <p:sldId id="285" r:id="rId28"/>
+    <p:sldId id="286" r:id="rId29"/>
+    <p:sldId id="287" r:id="rId30"/>
   </p:sldIdLst>
   <p:sldSz cx="9144000" cy="6858000" type="screen4x3"/>
   <p:notesSz cx="6858000" cy="9144000"/>
@@ -661,7 +664,7 @@
           <a:bodyPr/>
           <a:lstStyle/>
           <a:p>
-            <a:endParaRPr lang="en-GB"/>
+            <a:endParaRPr lang="en-GB" dirty="0"/>
           </a:p>
         </p:txBody>
       </p:sp>
@@ -768,7 +771,7 @@
             <a:fld id="{7DE1BD2A-F24E-4ECA-82B3-08C5D5A627D6}" type="slidenum">
               <a:rPr lang="nl-NL" smtClean="0"/>
               <a:pPr/>
-              <a:t>2</a:t>
+              <a:t>5</a:t>
             </a:fld>
             <a:endParaRPr lang="nl-NL" dirty="0"/>
           </a:p>
@@ -853,7 +856,7 @@
             <a:fld id="{7DE1BD2A-F24E-4ECA-82B3-08C5D5A627D6}" type="slidenum">
               <a:rPr lang="nl-NL" smtClean="0"/>
               <a:pPr/>
-              <a:t>3</a:t>
+              <a:t>6</a:t>
             </a:fld>
             <a:endParaRPr lang="nl-NL" dirty="0"/>
           </a:p>
@@ -938,7 +941,7 @@
             <a:fld id="{7DE1BD2A-F24E-4ECA-82B3-08C5D5A627D6}" type="slidenum">
               <a:rPr lang="nl-NL" smtClean="0"/>
               <a:pPr/>
-              <a:t>4</a:t>
+              <a:t>7</a:t>
             </a:fld>
             <a:endParaRPr lang="nl-NL" dirty="0"/>
           </a:p>
@@ -1023,7 +1026,7 @@
             <a:fld id="{7DE1BD2A-F24E-4ECA-82B3-08C5D5A627D6}" type="slidenum">
               <a:rPr lang="nl-NL" smtClean="0"/>
               <a:pPr/>
-              <a:t>5</a:t>
+              <a:t>8</a:t>
             </a:fld>
             <a:endParaRPr lang="nl-NL" dirty="0"/>
           </a:p>
@@ -1108,7 +1111,7 @@
             <a:fld id="{7DE1BD2A-F24E-4ECA-82B3-08C5D5A627D6}" type="slidenum">
               <a:rPr lang="nl-NL" smtClean="0"/>
               <a:pPr/>
-              <a:t>6</a:t>
+              <a:t>9</a:t>
             </a:fld>
             <a:endParaRPr lang="nl-NL" dirty="0"/>
           </a:p>
@@ -1193,7 +1196,7 @@
             <a:fld id="{7DE1BD2A-F24E-4ECA-82B3-08C5D5A627D6}" type="slidenum">
               <a:rPr lang="nl-NL" smtClean="0"/>
               <a:pPr/>
-              <a:t>7</a:t>
+              <a:t>10</a:t>
             </a:fld>
             <a:endParaRPr lang="nl-NL" dirty="0"/>
           </a:p>
@@ -1278,7 +1281,7 @@
             <a:fld id="{7DE1BD2A-F24E-4ECA-82B3-08C5D5A627D6}" type="slidenum">
               <a:rPr lang="nl-NL" smtClean="0"/>
               <a:pPr/>
-              <a:t>8</a:t>
+              <a:t>11</a:t>
             </a:fld>
             <a:endParaRPr lang="nl-NL" dirty="0"/>
           </a:p>
@@ -1363,7 +1366,7 @@
             <a:fld id="{7DE1BD2A-F24E-4ECA-82B3-08C5D5A627D6}" type="slidenum">
               <a:rPr lang="nl-NL" smtClean="0"/>
               <a:pPr/>
-              <a:t>16</a:t>
+              <a:t>19</a:t>
             </a:fld>
             <a:endParaRPr lang="nl-NL" dirty="0"/>
           </a:p>
@@ -1719,7 +1722,7 @@
           <a:p>
             <a:fld id="{23DF864D-1B61-4521-A36D-FDB145DD7CEB}" type="datetime3">
               <a:rPr lang="nl-NL" noProof="0" smtClean="0"/>
-              <a:t>15/10/14</a:t>
+              <a:t>17/10/14</a:t>
             </a:fld>
             <a:endParaRPr lang="en-US" noProof="0" dirty="0"/>
           </a:p>
@@ -1994,7 +1997,7 @@
           <a:p>
             <a:fld id="{06ABBB9F-9E1F-4802-B6EB-CC383592975C}" type="datetime3">
               <a:rPr lang="nl-NL" noProof="0" smtClean="0"/>
-              <a:t>15/10/14</a:t>
+              <a:t>17/10/14</a:t>
             </a:fld>
             <a:endParaRPr lang="en-US" noProof="0" dirty="0"/>
           </a:p>
@@ -2269,7 +2272,7 @@
           <a:p>
             <a:fld id="{246BC0A9-048A-40E6-8D4E-2B205B26DAC7}" type="datetime3">
               <a:rPr lang="nl-NL" noProof="0" smtClean="0"/>
-              <a:t>15/10/14</a:t>
+              <a:t>17/10/14</a:t>
             </a:fld>
             <a:endParaRPr lang="en-US" noProof="0" dirty="0"/>
           </a:p>
@@ -2624,7 +2627,7 @@
           <a:p>
             <a:fld id="{D32F8004-2E9F-4560-891B-26A5CC17F85C}" type="datetime3">
               <a:rPr lang="nl-NL" noProof="0" smtClean="0"/>
-              <a:t>15/10/14</a:t>
+              <a:t>17/10/14</a:t>
             </a:fld>
             <a:endParaRPr lang="en-US" noProof="0" dirty="0"/>
           </a:p>
@@ -2899,7 +2902,7 @@
           <a:p>
             <a:fld id="{97EB7632-DE33-4331-A055-19DCDA3DD871}" type="datetime3">
               <a:rPr lang="nl-NL" noProof="0" smtClean="0"/>
-              <a:t>15/10/14</a:t>
+              <a:t>17/10/14</a:t>
             </a:fld>
             <a:endParaRPr lang="en-US" noProof="0" dirty="0"/>
           </a:p>
@@ -3105,7 +3108,7 @@
           <a:p>
             <a:fld id="{0FC57531-6B75-4974-A423-001D50C238DB}" type="datetime3">
               <a:rPr lang="nl-NL" noProof="0" smtClean="0"/>
-              <a:t>15/10/14</a:t>
+              <a:t>17/10/14</a:t>
             </a:fld>
             <a:endParaRPr lang="en-US" noProof="0" dirty="0"/>
           </a:p>
@@ -3353,7 +3356,7 @@
           <a:p>
             <a:fld id="{CC27C98A-0729-41E3-82F5-92D56873FB58}" type="datetime3">
               <a:rPr lang="nl-NL" noProof="0" smtClean="0"/>
-              <a:t>15/10/14</a:t>
+              <a:t>17/10/14</a:t>
             </a:fld>
             <a:endParaRPr lang="en-US" noProof="0" dirty="0"/>
           </a:p>
@@ -3580,7 +3583,7 @@
           <a:p>
             <a:fld id="{DB02A68B-BEC3-4F33-8FDB-82A382F28CC9}" type="datetime3">
               <a:rPr lang="nl-NL" noProof="0" smtClean="0"/>
-              <a:t>15/10/14</a:t>
+              <a:t>17/10/14</a:t>
             </a:fld>
             <a:endParaRPr lang="en-US" noProof="0" dirty="0"/>
           </a:p>
@@ -3861,7 +3864,7 @@
           <a:p>
             <a:fld id="{5F354141-E7A1-47A6-933B-0D478F1BD20C}" type="datetime3">
               <a:rPr lang="nl-NL" noProof="0" smtClean="0"/>
-              <a:t>15/10/14</a:t>
+              <a:t>17/10/14</a:t>
             </a:fld>
             <a:endParaRPr lang="en-US" noProof="0" dirty="0"/>
           </a:p>
@@ -4060,7 +4063,7 @@
           <a:p>
             <a:fld id="{0C9076BC-C525-4022-B09E-C2F95E504BD5}" type="datetime3">
               <a:rPr lang="nl-NL" noProof="0" smtClean="0"/>
-              <a:t>15/10/14</a:t>
+              <a:t>17/10/14</a:t>
             </a:fld>
             <a:endParaRPr lang="en-US" noProof="0" dirty="0"/>
           </a:p>
@@ -4767,7 +4770,7 @@
           <a:p>
             <a:fld id="{6C5089AC-22B4-4839-A145-81A526290EAB}" type="datetime3">
               <a:rPr lang="nl-NL" smtClean="0"/>
-              <a:t>15/10/14</a:t>
+              <a:t>17/10/14</a:t>
             </a:fld>
             <a:endParaRPr lang="nl-NL" dirty="0"/>
           </a:p>
@@ -5550,6 +5553,367 @@
           <a:chExt cx="0" cy="0"/>
         </a:xfrm>
       </p:grpSpPr>
+      <p:pic>
+        <p:nvPicPr>
+          <p:cNvPr id="8" name="Content Placeholder 7"/>
+          <p:cNvPicPr>
+            <a:picLocks noGrp="1" noChangeAspect="1"/>
+          </p:cNvPicPr>
+          <p:nvPr>
+            <p:ph idx="1"/>
+          </p:nvPr>
+        </p:nvPicPr>
+        <p:blipFill>
+          <a:blip r:embed="rId3">
+            <a:extLst>
+              <a:ext uri="{28A0092B-C50C-407E-A947-70E740481C1C}">
+                <a14:useLocalDpi xmlns:a14="http://schemas.microsoft.com/office/drawing/2010/main" val="0"/>
+              </a:ext>
+            </a:extLst>
+          </a:blip>
+          <a:stretch>
+            <a:fillRect/>
+          </a:stretch>
+        </p:blipFill>
+        <p:spPr>
+          <a:xfrm>
+            <a:off x="4" y="-13063"/>
+            <a:ext cx="13487392" cy="6884190"/>
+          </a:xfrm>
+        </p:spPr>
+      </p:pic>
+    </p:spTree>
+    <p:extLst>
+      <p:ext uri="{BB962C8B-B14F-4D97-AF65-F5344CB8AC3E}">
+        <p14:creationId xmlns:p14="http://schemas.microsoft.com/office/powerpoint/2010/main" val="3012314909"/>
+      </p:ext>
+    </p:extLst>
+  </p:cSld>
+  <p:clrMapOvr>
+    <a:masterClrMapping/>
+  </p:clrMapOvr>
+  <p:timing>
+    <p:tnLst>
+      <p:par>
+        <p:cTn id="1" dur="indefinite" restart="never" nodeType="tmRoot"/>
+      </p:par>
+    </p:tnLst>
+  </p:timing>
+</p:sld>
+</file>
+
+<file path=ppt/slides/slide11.xml><?xml version="1.0" encoding="utf-8"?>
+<p:sld xmlns:a="http://schemas.openxmlformats.org/drawingml/2006/main" xmlns:r="http://schemas.openxmlformats.org/officeDocument/2006/relationships" xmlns:p="http://schemas.openxmlformats.org/presentationml/2006/main">
+  <p:cSld>
+    <p:spTree>
+      <p:nvGrpSpPr>
+        <p:cNvPr id="1" name=""/>
+        <p:cNvGrpSpPr/>
+        <p:nvPr/>
+      </p:nvGrpSpPr>
+      <p:grpSpPr>
+        <a:xfrm>
+          <a:off x="0" y="0"/>
+          <a:ext cx="0" cy="0"/>
+          <a:chOff x="0" y="0"/>
+          <a:chExt cx="0" cy="0"/>
+        </a:xfrm>
+      </p:grpSpPr>
+      <p:pic>
+        <p:nvPicPr>
+          <p:cNvPr id="8" name="Content Placeholder 7"/>
+          <p:cNvPicPr>
+            <a:picLocks noGrp="1" noChangeAspect="1"/>
+          </p:cNvPicPr>
+          <p:nvPr>
+            <p:ph idx="1"/>
+          </p:nvPr>
+        </p:nvPicPr>
+        <p:blipFill>
+          <a:blip r:embed="rId3">
+            <a:extLst>
+              <a:ext uri="{28A0092B-C50C-407E-A947-70E740481C1C}">
+                <a14:useLocalDpi xmlns:a14="http://schemas.microsoft.com/office/drawing/2010/main" val="0"/>
+              </a:ext>
+            </a:extLst>
+          </a:blip>
+          <a:stretch>
+            <a:fillRect/>
+          </a:stretch>
+        </p:blipFill>
+        <p:spPr>
+          <a:xfrm>
+            <a:off x="4" y="-13063"/>
+            <a:ext cx="13487392" cy="6884189"/>
+          </a:xfrm>
+        </p:spPr>
+      </p:pic>
+    </p:spTree>
+    <p:extLst>
+      <p:ext uri="{BB962C8B-B14F-4D97-AF65-F5344CB8AC3E}">
+        <p14:creationId xmlns:p14="http://schemas.microsoft.com/office/powerpoint/2010/main" val="3837428961"/>
+      </p:ext>
+    </p:extLst>
+  </p:cSld>
+  <p:clrMapOvr>
+    <a:masterClrMapping/>
+  </p:clrMapOvr>
+  <p:timing>
+    <p:tnLst>
+      <p:par>
+        <p:cTn id="1" dur="indefinite" restart="never" nodeType="tmRoot"/>
+      </p:par>
+    </p:tnLst>
+  </p:timing>
+</p:sld>
+</file>
+
+<file path=ppt/slides/slide12.xml><?xml version="1.0" encoding="utf-8"?>
+<p:sld xmlns:a="http://schemas.openxmlformats.org/drawingml/2006/main" xmlns:r="http://schemas.openxmlformats.org/officeDocument/2006/relationships" xmlns:p="http://schemas.openxmlformats.org/presentationml/2006/main">
+  <p:cSld>
+    <p:bg>
+      <p:bgPr>
+        <a:solidFill>
+          <a:schemeClr val="bg1"/>
+        </a:solidFill>
+        <a:effectLst/>
+      </p:bgPr>
+    </p:bg>
+    <p:spTree>
+      <p:nvGrpSpPr>
+        <p:cNvPr id="1" name=""/>
+        <p:cNvGrpSpPr/>
+        <p:nvPr/>
+      </p:nvGrpSpPr>
+      <p:grpSpPr>
+        <a:xfrm>
+          <a:off x="0" y="0"/>
+          <a:ext cx="0" cy="0"/>
+          <a:chOff x="0" y="0"/>
+          <a:chExt cx="0" cy="0"/>
+        </a:xfrm>
+      </p:grpSpPr>
+      <p:sp>
+        <p:nvSpPr>
+          <p:cNvPr id="2" name="Content Placeholder 1"/>
+          <p:cNvSpPr>
+            <a:spLocks noGrp="1"/>
+          </p:cNvSpPr>
+          <p:nvPr>
+            <p:ph idx="1"/>
+          </p:nvPr>
+        </p:nvSpPr>
+        <p:spPr/>
+        <p:txBody>
+          <a:bodyPr/>
+          <a:lstStyle/>
+          <a:p>
+            <a:r>
+              <a:rPr lang="en-GB" dirty="0" smtClean="0"/>
+              <a:t>Highly </a:t>
+            </a:r>
+            <a:r>
+              <a:rPr lang="en-GB" dirty="0" smtClean="0"/>
+              <a:t>relevant documents are more useful than marginally relevant </a:t>
+            </a:r>
+            <a:r>
+              <a:rPr lang="en-GB" dirty="0" smtClean="0"/>
+              <a:t>documents</a:t>
+            </a:r>
+          </a:p>
+          <a:p>
+            <a:endParaRPr lang="en-GB" dirty="0"/>
+          </a:p>
+          <a:p>
+            <a:endParaRPr lang="en-GB" dirty="0" smtClean="0"/>
+          </a:p>
+          <a:p>
+            <a:r>
+              <a:rPr lang="en-GB" dirty="0"/>
+              <a:t>Highly relevant documents are more useful when appearing higher in a search engine result list</a:t>
+            </a:r>
+          </a:p>
+          <a:p>
+            <a:endParaRPr lang="en-GB" dirty="0" smtClean="0"/>
+          </a:p>
+          <a:p>
+            <a:endParaRPr lang="en-GB" dirty="0"/>
+          </a:p>
+        </p:txBody>
+      </p:sp>
+      <p:sp>
+        <p:nvSpPr>
+          <p:cNvPr id="3" name="Text Placeholder 2"/>
+          <p:cNvSpPr>
+            <a:spLocks noGrp="1"/>
+          </p:cNvSpPr>
+          <p:nvPr>
+            <p:ph type="body" sz="quarter" idx="13"/>
+          </p:nvPr>
+        </p:nvSpPr>
+        <p:spPr/>
+        <p:txBody>
+          <a:bodyPr/>
+          <a:lstStyle/>
+          <a:p>
+            <a:r>
+              <a:rPr lang="en-GB" dirty="0" smtClean="0"/>
+              <a:t>So… what makes a good ranking?</a:t>
+            </a:r>
+            <a:endParaRPr lang="en-GB" dirty="0"/>
+          </a:p>
+        </p:txBody>
+      </p:sp>
+      <p:sp>
+        <p:nvSpPr>
+          <p:cNvPr id="4" name="Text Placeholder 3"/>
+          <p:cNvSpPr>
+            <a:spLocks noGrp="1"/>
+          </p:cNvSpPr>
+          <p:nvPr>
+            <p:ph type="body" sz="quarter" idx="14"/>
+          </p:nvPr>
+        </p:nvSpPr>
+        <p:spPr/>
+        <p:txBody>
+          <a:bodyPr/>
+          <a:lstStyle/>
+          <a:p>
+            <a:r>
+              <a:rPr lang="en-GB" dirty="0" smtClean="0"/>
+              <a:t>Normalized Discounted Cumulative Gain</a:t>
+            </a:r>
+            <a:endParaRPr lang="en-GB" dirty="0"/>
+          </a:p>
+        </p:txBody>
+      </p:sp>
+      <p:pic>
+        <p:nvPicPr>
+          <p:cNvPr id="5" name="Picture 4"/>
+          <p:cNvPicPr>
+            <a:picLocks noChangeAspect="1"/>
+          </p:cNvPicPr>
+          <p:nvPr/>
+        </p:nvPicPr>
+        <p:blipFill>
+          <a:blip r:embed="rId2">
+            <a:extLst>
+              <a:ext uri="{28A0092B-C50C-407E-A947-70E740481C1C}">
+                <a14:useLocalDpi xmlns:a14="http://schemas.microsoft.com/office/drawing/2010/main" val="0"/>
+              </a:ext>
+            </a:extLst>
+          </a:blip>
+          <a:stretch>
+            <a:fillRect/>
+          </a:stretch>
+        </p:blipFill>
+        <p:spPr>
+          <a:xfrm>
+            <a:off x="1276156" y="2819400"/>
+            <a:ext cx="1390844" cy="609685"/>
+          </a:xfrm>
+          <a:prstGeom prst="rect">
+            <a:avLst/>
+          </a:prstGeom>
+        </p:spPr>
+      </p:pic>
+      <p:pic>
+        <p:nvPicPr>
+          <p:cNvPr id="6" name="Picture 5"/>
+          <p:cNvPicPr>
+            <a:picLocks noChangeAspect="1"/>
+          </p:cNvPicPr>
+          <p:nvPr/>
+        </p:nvPicPr>
+        <p:blipFill>
+          <a:blip r:embed="rId3">
+            <a:extLst>
+              <a:ext uri="{28A0092B-C50C-407E-A947-70E740481C1C}">
+                <a14:useLocalDpi xmlns:a14="http://schemas.microsoft.com/office/drawing/2010/main" val="0"/>
+              </a:ext>
+            </a:extLst>
+          </a:blip>
+          <a:stretch>
+            <a:fillRect/>
+          </a:stretch>
+        </p:blipFill>
+        <p:spPr>
+          <a:xfrm>
+            <a:off x="1276156" y="4344611"/>
+            <a:ext cx="2019582" cy="609685"/>
+          </a:xfrm>
+          <a:prstGeom prst="rect">
+            <a:avLst/>
+          </a:prstGeom>
+        </p:spPr>
+      </p:pic>
+      <p:pic>
+        <p:nvPicPr>
+          <p:cNvPr id="7" name="Picture 6"/>
+          <p:cNvPicPr>
+            <a:picLocks noChangeAspect="1"/>
+          </p:cNvPicPr>
+          <p:nvPr/>
+        </p:nvPicPr>
+        <p:blipFill>
+          <a:blip r:embed="rId4">
+            <a:extLst>
+              <a:ext uri="{28A0092B-C50C-407E-A947-70E740481C1C}">
+                <a14:useLocalDpi xmlns:a14="http://schemas.microsoft.com/office/drawing/2010/main" val="0"/>
+              </a:ext>
+            </a:extLst>
+          </a:blip>
+          <a:stretch>
+            <a:fillRect/>
+          </a:stretch>
+        </p:blipFill>
+        <p:spPr>
+          <a:xfrm>
+            <a:off x="1276156" y="5286677"/>
+            <a:ext cx="1638529" cy="533474"/>
+          </a:xfrm>
+          <a:prstGeom prst="rect">
+            <a:avLst/>
+          </a:prstGeom>
+        </p:spPr>
+      </p:pic>
+    </p:spTree>
+    <p:extLst>
+      <p:ext uri="{BB962C8B-B14F-4D97-AF65-F5344CB8AC3E}">
+        <p14:creationId xmlns:p14="http://schemas.microsoft.com/office/powerpoint/2010/main" val="1086106109"/>
+      </p:ext>
+    </p:extLst>
+  </p:cSld>
+  <p:clrMapOvr>
+    <a:masterClrMapping/>
+  </p:clrMapOvr>
+  <p:timing>
+    <p:tnLst>
+      <p:par>
+        <p:cTn id="1" dur="indefinite" restart="never" nodeType="tmRoot"/>
+      </p:par>
+    </p:tnLst>
+  </p:timing>
+</p:sld>
+</file>
+
+<file path=ppt/slides/slide13.xml><?xml version="1.0" encoding="utf-8"?>
+<p:sld xmlns:a="http://schemas.openxmlformats.org/drawingml/2006/main" xmlns:r="http://schemas.openxmlformats.org/officeDocument/2006/relationships" xmlns:p="http://schemas.openxmlformats.org/presentationml/2006/main">
+  <p:cSld>
+    <p:spTree>
+      <p:nvGrpSpPr>
+        <p:cNvPr id="1" name=""/>
+        <p:cNvGrpSpPr/>
+        <p:nvPr/>
+      </p:nvGrpSpPr>
+      <p:grpSpPr>
+        <a:xfrm>
+          <a:off x="0" y="0"/>
+          <a:ext cx="0" cy="0"/>
+          <a:chOff x="0" y="0"/>
+          <a:chExt cx="0" cy="0"/>
+        </a:xfrm>
+      </p:grpSpPr>
       <p:sp>
         <p:nvSpPr>
           <p:cNvPr id="3" name="Text Placeholder 2"/>
@@ -5642,7 +6006,7 @@
 </p:sld>
 </file>
 
-<file path=ppt/slides/slide11.xml><?xml version="1.0" encoding="utf-8"?>
+<file path=ppt/slides/slide14.xml><?xml version="1.0" encoding="utf-8"?>
 <p:sld xmlns:a="http://schemas.openxmlformats.org/drawingml/2006/main" xmlns:r="http://schemas.openxmlformats.org/officeDocument/2006/relationships" xmlns:p="http://schemas.openxmlformats.org/presentationml/2006/main">
   <p:cSld>
     <p:spTree>
@@ -5746,7 +6110,7 @@
 </p:sld>
 </file>
 
-<file path=ppt/slides/slide12.xml><?xml version="1.0" encoding="utf-8"?>
+<file path=ppt/slides/slide15.xml><?xml version="1.0" encoding="utf-8"?>
 <p:sld xmlns:a="http://schemas.openxmlformats.org/drawingml/2006/main" xmlns:r="http://schemas.openxmlformats.org/officeDocument/2006/relationships" xmlns:p="http://schemas.openxmlformats.org/presentationml/2006/main">
   <p:cSld>
     <p:spTree>
@@ -5854,7 +6218,7 @@
 </p:sld>
 </file>
 
-<file path=ppt/slides/slide13.xml><?xml version="1.0" encoding="utf-8"?>
+<file path=ppt/slides/slide16.xml><?xml version="1.0" encoding="utf-8"?>
 <p:sld xmlns:a="http://schemas.openxmlformats.org/drawingml/2006/main" xmlns:r="http://schemas.openxmlformats.org/officeDocument/2006/relationships" xmlns:p="http://schemas.openxmlformats.org/presentationml/2006/main">
   <p:cSld>
     <p:spTree>
@@ -6433,7 +6797,7 @@
 </p:sld>
 </file>
 
-<file path=ppt/slides/slide14.xml><?xml version="1.0" encoding="utf-8"?>
+<file path=ppt/slides/slide17.xml><?xml version="1.0" encoding="utf-8"?>
 <p:sld xmlns:a="http://schemas.openxmlformats.org/drawingml/2006/main" xmlns:r="http://schemas.openxmlformats.org/officeDocument/2006/relationships" xmlns:p="http://schemas.openxmlformats.org/presentationml/2006/main">
   <p:cSld>
     <p:spTree>
@@ -6541,7 +6905,7 @@
 </p:sld>
 </file>
 
-<file path=ppt/slides/slide15.xml><?xml version="1.0" encoding="utf-8"?>
+<file path=ppt/slides/slide18.xml><?xml version="1.0" encoding="utf-8"?>
 <p:sld xmlns:a="http://schemas.openxmlformats.org/drawingml/2006/main" xmlns:r="http://schemas.openxmlformats.org/officeDocument/2006/relationships" xmlns:p="http://schemas.openxmlformats.org/presentationml/2006/main">
   <p:cSld>
     <p:spTree>
@@ -6679,7 +7043,7 @@
 </p:sld>
 </file>
 
-<file path=ppt/slides/slide16.xml><?xml version="1.0" encoding="utf-8"?>
+<file path=ppt/slides/slide19.xml><?xml version="1.0" encoding="utf-8"?>
 <p:sld xmlns:a="http://schemas.openxmlformats.org/drawingml/2006/main" xmlns:r="http://schemas.openxmlformats.org/officeDocument/2006/relationships" xmlns:p="http://schemas.openxmlformats.org/presentationml/2006/main">
   <p:cSld>
     <p:spTree>
@@ -6745,7 +7109,73 @@
 </p:sld>
 </file>
 
-<file path=ppt/slides/slide17.xml><?xml version="1.0" encoding="utf-8"?>
+<file path=ppt/slides/slide2.xml><?xml version="1.0" encoding="utf-8"?>
+<p:sld xmlns:a="http://schemas.openxmlformats.org/drawingml/2006/main" xmlns:r="http://schemas.openxmlformats.org/officeDocument/2006/relationships" xmlns:p="http://schemas.openxmlformats.org/presentationml/2006/main">
+  <p:cSld>
+    <p:spTree>
+      <p:nvGrpSpPr>
+        <p:cNvPr id="1" name=""/>
+        <p:cNvGrpSpPr/>
+        <p:nvPr/>
+      </p:nvGrpSpPr>
+      <p:grpSpPr>
+        <a:xfrm>
+          <a:off x="0" y="0"/>
+          <a:ext cx="0" cy="0"/>
+          <a:chOff x="0" y="0"/>
+          <a:chExt cx="0" cy="0"/>
+        </a:xfrm>
+      </p:grpSpPr>
+      <p:pic>
+        <p:nvPicPr>
+          <p:cNvPr id="5" name="Content Placeholder 4"/>
+          <p:cNvPicPr>
+            <a:picLocks noGrp="1" noChangeAspect="1"/>
+          </p:cNvPicPr>
+          <p:nvPr>
+            <p:ph idx="1"/>
+          </p:nvPr>
+        </p:nvPicPr>
+        <p:blipFill>
+          <a:blip r:embed="rId2">
+            <a:extLst>
+              <a:ext uri="{28A0092B-C50C-407E-A947-70E740481C1C}">
+                <a14:useLocalDpi xmlns:a14="http://schemas.microsoft.com/office/drawing/2010/main" val="0"/>
+              </a:ext>
+            </a:extLst>
+          </a:blip>
+          <a:stretch>
+            <a:fillRect/>
+          </a:stretch>
+        </p:blipFill>
+        <p:spPr>
+          <a:xfrm>
+            <a:off x="533401" y="1308100"/>
+            <a:ext cx="8661398" cy="4330699"/>
+          </a:xfrm>
+        </p:spPr>
+      </p:pic>
+    </p:spTree>
+    <p:extLst>
+      <p:ext uri="{BB962C8B-B14F-4D97-AF65-F5344CB8AC3E}">
+        <p14:creationId xmlns:p14="http://schemas.microsoft.com/office/powerpoint/2010/main" val="1275140577"/>
+      </p:ext>
+    </p:extLst>
+  </p:cSld>
+  <p:clrMapOvr>
+    <a:masterClrMapping/>
+  </p:clrMapOvr>
+  <p:timing>
+    <p:tnLst>
+      <p:par>
+        <p:cTn id="1" dur="indefinite" restart="never" nodeType="tmRoot"/>
+      </p:par>
+    </p:tnLst>
+  </p:timing>
+</p:sld>
+</file>
+
+<file path=ppt/slides/slide20.xml><?xml version="1.0" encoding="utf-8"?>
 <p:sld xmlns:a="http://schemas.openxmlformats.org/drawingml/2006/main" xmlns:r="http://schemas.openxmlformats.org/officeDocument/2006/relationships" xmlns:p="http://schemas.openxmlformats.org/presentationml/2006/main">
   <p:cSld>
     <p:spTree>
@@ -6900,7 +7330,7 @@
 </p:sld>
 </file>
 
-<file path=ppt/slides/slide18.xml><?xml version="1.0" encoding="utf-8"?>
+<file path=ppt/slides/slide21.xml><?xml version="1.0" encoding="utf-8"?>
 <p:sld xmlns:a="http://schemas.openxmlformats.org/drawingml/2006/main" xmlns:r="http://schemas.openxmlformats.org/officeDocument/2006/relationships" xmlns:p="http://schemas.openxmlformats.org/presentationml/2006/main">
   <p:cSld>
     <p:spTree>
@@ -7008,7 +7438,7 @@
 </p:sld>
 </file>
 
-<file path=ppt/slides/slide19.xml><?xml version="1.0" encoding="utf-8"?>
+<file path=ppt/slides/slide22.xml><?xml version="1.0" encoding="utf-8"?>
 <p:sld xmlns:a="http://schemas.openxmlformats.org/drawingml/2006/main" xmlns:r="http://schemas.openxmlformats.org/officeDocument/2006/relationships" xmlns:p="http://schemas.openxmlformats.org/presentationml/2006/main">
   <p:cSld>
     <p:spTree>
@@ -7148,7 +7578,872 @@
 </p:sld>
 </file>
 
-<file path=ppt/slides/slide2.xml><?xml version="1.0" encoding="utf-8"?>
+<file path=ppt/slides/slide23.xml><?xml version="1.0" encoding="utf-8"?>
+<p:sld xmlns:a="http://schemas.openxmlformats.org/drawingml/2006/main" xmlns:r="http://schemas.openxmlformats.org/officeDocument/2006/relationships" xmlns:p="http://schemas.openxmlformats.org/presentationml/2006/main">
+  <p:cSld>
+    <p:spTree>
+      <p:nvGrpSpPr>
+        <p:cNvPr id="1" name=""/>
+        <p:cNvGrpSpPr/>
+        <p:nvPr/>
+      </p:nvGrpSpPr>
+      <p:grpSpPr>
+        <a:xfrm>
+          <a:off x="0" y="0"/>
+          <a:ext cx="0" cy="0"/>
+          <a:chOff x="0" y="0"/>
+          <a:chExt cx="0" cy="0"/>
+        </a:xfrm>
+      </p:grpSpPr>
+      <p:pic>
+        <p:nvPicPr>
+          <p:cNvPr id="5" name="Content Placeholder 4"/>
+          <p:cNvPicPr>
+            <a:picLocks noGrp="1" noChangeAspect="1"/>
+          </p:cNvPicPr>
+          <p:nvPr>
+            <p:ph idx="1"/>
+          </p:nvPr>
+        </p:nvPicPr>
+        <p:blipFill>
+          <a:blip r:embed="rId2" cstate="print">
+            <a:extLst>
+              <a:ext uri="{28A0092B-C50C-407E-A947-70E740481C1C}">
+                <a14:useLocalDpi xmlns:a14="http://schemas.microsoft.com/office/drawing/2010/main" val="0"/>
+              </a:ext>
+            </a:extLst>
+          </a:blip>
+          <a:stretch>
+            <a:fillRect/>
+          </a:stretch>
+        </p:blipFill>
+        <p:spPr>
+          <a:xfrm>
+            <a:off x="1082887" y="1982176"/>
+            <a:ext cx="7785181" cy="3198382"/>
+          </a:xfrm>
+        </p:spPr>
+      </p:pic>
+      <p:sp>
+        <p:nvSpPr>
+          <p:cNvPr id="3" name="Text Placeholder 2"/>
+          <p:cNvSpPr>
+            <a:spLocks noGrp="1"/>
+          </p:cNvSpPr>
+          <p:nvPr>
+            <p:ph type="body" sz="quarter" idx="13"/>
+          </p:nvPr>
+        </p:nvSpPr>
+        <p:spPr/>
+        <p:txBody>
+          <a:bodyPr/>
+          <a:lstStyle/>
+          <a:p>
+            <a:r>
+              <a:rPr lang="en-GB" dirty="0" err="1" smtClean="0"/>
+              <a:t>MapReduce</a:t>
+            </a:r>
+            <a:endParaRPr lang="en-GB" dirty="0"/>
+          </a:p>
+        </p:txBody>
+      </p:sp>
+      <p:sp>
+        <p:nvSpPr>
+          <p:cNvPr id="4" name="Text Placeholder 3"/>
+          <p:cNvSpPr>
+            <a:spLocks noGrp="1"/>
+          </p:cNvSpPr>
+          <p:nvPr>
+            <p:ph type="body" sz="quarter" idx="14"/>
+          </p:nvPr>
+        </p:nvSpPr>
+        <p:spPr/>
+        <p:txBody>
+          <a:bodyPr/>
+          <a:lstStyle/>
+          <a:p>
+            <a:endParaRPr lang="en-GB"/>
+          </a:p>
+        </p:txBody>
+      </p:sp>
+    </p:spTree>
+    <p:extLst>
+      <p:ext uri="{BB962C8B-B14F-4D97-AF65-F5344CB8AC3E}">
+        <p14:creationId xmlns:p14="http://schemas.microsoft.com/office/powerpoint/2010/main" val="798841358"/>
+      </p:ext>
+    </p:extLst>
+  </p:cSld>
+  <p:clrMapOvr>
+    <a:masterClrMapping/>
+  </p:clrMapOvr>
+  <p:timing>
+    <p:tnLst>
+      <p:par>
+        <p:cTn id="1" dur="indefinite" restart="never" nodeType="tmRoot"/>
+      </p:par>
+    </p:tnLst>
+  </p:timing>
+</p:sld>
+</file>
+
+<file path=ppt/slides/slide24.xml><?xml version="1.0" encoding="utf-8"?>
+<p:sld xmlns:a="http://schemas.openxmlformats.org/drawingml/2006/main" xmlns:r="http://schemas.openxmlformats.org/officeDocument/2006/relationships" xmlns:p="http://schemas.openxmlformats.org/presentationml/2006/main">
+  <p:cSld>
+    <p:spTree>
+      <p:nvGrpSpPr>
+        <p:cNvPr id="1" name=""/>
+        <p:cNvGrpSpPr/>
+        <p:nvPr/>
+      </p:nvGrpSpPr>
+      <p:grpSpPr>
+        <a:xfrm>
+          <a:off x="0" y="0"/>
+          <a:ext cx="0" cy="0"/>
+          <a:chOff x="0" y="0"/>
+          <a:chExt cx="0" cy="0"/>
+        </a:xfrm>
+      </p:grpSpPr>
+      <p:pic>
+        <p:nvPicPr>
+          <p:cNvPr id="5" name="Content Placeholder 4"/>
+          <p:cNvPicPr>
+            <a:picLocks noGrp="1" noChangeAspect="1"/>
+          </p:cNvPicPr>
+          <p:nvPr>
+            <p:ph idx="1"/>
+          </p:nvPr>
+        </p:nvPicPr>
+        <p:blipFill>
+          <a:blip r:embed="rId2">
+            <a:extLst>
+              <a:ext uri="{28A0092B-C50C-407E-A947-70E740481C1C}">
+                <a14:useLocalDpi xmlns:a14="http://schemas.microsoft.com/office/drawing/2010/main" val="0"/>
+              </a:ext>
+            </a:extLst>
+          </a:blip>
+          <a:stretch>
+            <a:fillRect/>
+          </a:stretch>
+        </p:blipFill>
+        <p:spPr>
+          <a:xfrm>
+            <a:off x="1079500" y="2312717"/>
+            <a:ext cx="7800975" cy="3037429"/>
+          </a:xfrm>
+        </p:spPr>
+      </p:pic>
+      <p:sp>
+        <p:nvSpPr>
+          <p:cNvPr id="3" name="Text Placeholder 2"/>
+          <p:cNvSpPr>
+            <a:spLocks noGrp="1"/>
+          </p:cNvSpPr>
+          <p:nvPr>
+            <p:ph type="body" sz="quarter" idx="13"/>
+          </p:nvPr>
+        </p:nvSpPr>
+        <p:spPr/>
+        <p:txBody>
+          <a:bodyPr/>
+          <a:lstStyle/>
+          <a:p>
+            <a:r>
+              <a:rPr lang="en-GB" dirty="0" err="1" smtClean="0"/>
+              <a:t>Preprocessing</a:t>
+            </a:r>
+            <a:endParaRPr lang="en-GB" dirty="0"/>
+          </a:p>
+        </p:txBody>
+      </p:sp>
+      <p:sp>
+        <p:nvSpPr>
+          <p:cNvPr id="4" name="Text Placeholder 3"/>
+          <p:cNvSpPr>
+            <a:spLocks noGrp="1"/>
+          </p:cNvSpPr>
+          <p:nvPr>
+            <p:ph type="body" sz="quarter" idx="14"/>
+          </p:nvPr>
+        </p:nvSpPr>
+        <p:spPr/>
+        <p:txBody>
+          <a:bodyPr/>
+          <a:lstStyle/>
+          <a:p>
+            <a:endParaRPr lang="en-GB"/>
+          </a:p>
+        </p:txBody>
+      </p:sp>
+    </p:spTree>
+    <p:extLst>
+      <p:ext uri="{BB962C8B-B14F-4D97-AF65-F5344CB8AC3E}">
+        <p14:creationId xmlns:p14="http://schemas.microsoft.com/office/powerpoint/2010/main" val="1561782756"/>
+      </p:ext>
+    </p:extLst>
+  </p:cSld>
+  <p:clrMapOvr>
+    <a:masterClrMapping/>
+  </p:clrMapOvr>
+  <p:timing>
+    <p:tnLst>
+      <p:par>
+        <p:cTn id="1" dur="indefinite" restart="never" nodeType="tmRoot"/>
+      </p:par>
+    </p:tnLst>
+  </p:timing>
+</p:sld>
+</file>
+
+<file path=ppt/slides/slide25.xml><?xml version="1.0" encoding="utf-8"?>
+<p:sld xmlns:a="http://schemas.openxmlformats.org/drawingml/2006/main" xmlns:r="http://schemas.openxmlformats.org/officeDocument/2006/relationships" xmlns:p="http://schemas.openxmlformats.org/presentationml/2006/main">
+  <p:cSld>
+    <p:spTree>
+      <p:nvGrpSpPr>
+        <p:cNvPr id="1" name=""/>
+        <p:cNvGrpSpPr/>
+        <p:nvPr/>
+      </p:nvGrpSpPr>
+      <p:grpSpPr>
+        <a:xfrm>
+          <a:off x="0" y="0"/>
+          <a:ext cx="0" cy="0"/>
+          <a:chOff x="0" y="0"/>
+          <a:chExt cx="0" cy="0"/>
+        </a:xfrm>
+      </p:grpSpPr>
+      <p:pic>
+        <p:nvPicPr>
+          <p:cNvPr id="5" name="Content Placeholder 4"/>
+          <p:cNvPicPr>
+            <a:picLocks noGrp="1" noChangeAspect="1"/>
+          </p:cNvPicPr>
+          <p:nvPr>
+            <p:ph idx="1"/>
+          </p:nvPr>
+        </p:nvPicPr>
+        <p:blipFill>
+          <a:blip r:embed="rId2" cstate="print">
+            <a:extLst>
+              <a:ext uri="{28A0092B-C50C-407E-A947-70E740481C1C}">
+                <a14:useLocalDpi xmlns:a14="http://schemas.microsoft.com/office/drawing/2010/main" val="0"/>
+              </a:ext>
+            </a:extLst>
+          </a:blip>
+          <a:stretch>
+            <a:fillRect/>
+          </a:stretch>
+        </p:blipFill>
+        <p:spPr>
+          <a:xfrm>
+            <a:off x="762000" y="152400"/>
+            <a:ext cx="6096000" cy="6200765"/>
+          </a:xfrm>
+        </p:spPr>
+      </p:pic>
+    </p:spTree>
+    <p:extLst>
+      <p:ext uri="{BB962C8B-B14F-4D97-AF65-F5344CB8AC3E}">
+        <p14:creationId xmlns:p14="http://schemas.microsoft.com/office/powerpoint/2010/main" val="3552708193"/>
+      </p:ext>
+    </p:extLst>
+  </p:cSld>
+  <p:clrMapOvr>
+    <a:masterClrMapping/>
+  </p:clrMapOvr>
+  <p:timing>
+    <p:tnLst>
+      <p:par>
+        <p:cTn id="1" dur="indefinite" restart="never" nodeType="tmRoot"/>
+      </p:par>
+    </p:tnLst>
+  </p:timing>
+</p:sld>
+</file>
+
+<file path=ppt/slides/slide26.xml><?xml version="1.0" encoding="utf-8"?>
+<p:sld xmlns:a="http://schemas.openxmlformats.org/drawingml/2006/main" xmlns:r="http://schemas.openxmlformats.org/officeDocument/2006/relationships" xmlns:p="http://schemas.openxmlformats.org/presentationml/2006/main">
+  <p:cSld>
+    <p:spTree>
+      <p:nvGrpSpPr>
+        <p:cNvPr id="1" name=""/>
+        <p:cNvGrpSpPr/>
+        <p:nvPr/>
+      </p:nvGrpSpPr>
+      <p:grpSpPr>
+        <a:xfrm>
+          <a:off x="0" y="0"/>
+          <a:ext cx="0" cy="0"/>
+          <a:chOff x="0" y="0"/>
+          <a:chExt cx="0" cy="0"/>
+        </a:xfrm>
+      </p:grpSpPr>
+      <p:pic>
+        <p:nvPicPr>
+          <p:cNvPr id="5" name="Content Placeholder 4"/>
+          <p:cNvPicPr>
+            <a:picLocks noGrp="1" noChangeAspect="1"/>
+          </p:cNvPicPr>
+          <p:nvPr>
+            <p:ph idx="1"/>
+          </p:nvPr>
+        </p:nvPicPr>
+        <p:blipFill>
+          <a:blip r:embed="rId2">
+            <a:extLst>
+              <a:ext uri="{28A0092B-C50C-407E-A947-70E740481C1C}">
+                <a14:useLocalDpi xmlns:a14="http://schemas.microsoft.com/office/drawing/2010/main" val="0"/>
+              </a:ext>
+            </a:extLst>
+          </a:blip>
+          <a:stretch>
+            <a:fillRect/>
+          </a:stretch>
+        </p:blipFill>
+        <p:spPr>
+          <a:xfrm>
+            <a:off x="533400" y="228600"/>
+            <a:ext cx="6062291" cy="6019800"/>
+          </a:xfrm>
+        </p:spPr>
+      </p:pic>
+    </p:spTree>
+    <p:extLst>
+      <p:ext uri="{BB962C8B-B14F-4D97-AF65-F5344CB8AC3E}">
+        <p14:creationId xmlns:p14="http://schemas.microsoft.com/office/powerpoint/2010/main" val="3619904879"/>
+      </p:ext>
+    </p:extLst>
+  </p:cSld>
+  <p:clrMapOvr>
+    <a:masterClrMapping/>
+  </p:clrMapOvr>
+  <p:timing>
+    <p:tnLst>
+      <p:par>
+        <p:cTn id="1" dur="indefinite" restart="never" nodeType="tmRoot"/>
+      </p:par>
+    </p:tnLst>
+  </p:timing>
+</p:sld>
+</file>
+
+<file path=ppt/slides/slide27.xml><?xml version="1.0" encoding="utf-8"?>
+<p:sld xmlns:a="http://schemas.openxmlformats.org/drawingml/2006/main" xmlns:r="http://schemas.openxmlformats.org/officeDocument/2006/relationships" xmlns:p="http://schemas.openxmlformats.org/presentationml/2006/main">
+  <p:cSld>
+    <p:spTree>
+      <p:nvGrpSpPr>
+        <p:cNvPr id="1" name=""/>
+        <p:cNvGrpSpPr/>
+        <p:nvPr/>
+      </p:nvGrpSpPr>
+      <p:grpSpPr>
+        <a:xfrm>
+          <a:off x="0" y="0"/>
+          <a:ext cx="0" cy="0"/>
+          <a:chOff x="0" y="0"/>
+          <a:chExt cx="0" cy="0"/>
+        </a:xfrm>
+      </p:grpSpPr>
+      <p:pic>
+        <p:nvPicPr>
+          <p:cNvPr id="5" name="Content Placeholder 4"/>
+          <p:cNvPicPr>
+            <a:picLocks noGrp="1" noChangeAspect="1"/>
+          </p:cNvPicPr>
+          <p:nvPr>
+            <p:ph idx="1"/>
+          </p:nvPr>
+        </p:nvPicPr>
+        <p:blipFill>
+          <a:blip r:embed="rId2" cstate="print">
+            <a:extLst>
+              <a:ext uri="{28A0092B-C50C-407E-A947-70E740481C1C}">
+                <a14:useLocalDpi xmlns:a14="http://schemas.microsoft.com/office/drawing/2010/main" val="0"/>
+              </a:ext>
+            </a:extLst>
+          </a:blip>
+          <a:stretch>
+            <a:fillRect/>
+          </a:stretch>
+        </p:blipFill>
+        <p:spPr>
+          <a:xfrm>
+            <a:off x="457200" y="228600"/>
+            <a:ext cx="6005401" cy="6096000"/>
+          </a:xfrm>
+        </p:spPr>
+      </p:pic>
+    </p:spTree>
+    <p:extLst>
+      <p:ext uri="{BB962C8B-B14F-4D97-AF65-F5344CB8AC3E}">
+        <p14:creationId xmlns:p14="http://schemas.microsoft.com/office/powerpoint/2010/main" val="3222599415"/>
+      </p:ext>
+    </p:extLst>
+  </p:cSld>
+  <p:clrMapOvr>
+    <a:masterClrMapping/>
+  </p:clrMapOvr>
+  <p:timing>
+    <p:tnLst>
+      <p:par>
+        <p:cTn id="1" dur="indefinite" restart="never" nodeType="tmRoot"/>
+      </p:par>
+    </p:tnLst>
+  </p:timing>
+</p:sld>
+</file>
+
+<file path=ppt/slides/slide28.xml><?xml version="1.0" encoding="utf-8"?>
+<p:sld xmlns:a="http://schemas.openxmlformats.org/drawingml/2006/main" xmlns:r="http://schemas.openxmlformats.org/officeDocument/2006/relationships" xmlns:p="http://schemas.openxmlformats.org/presentationml/2006/main">
+  <p:cSld>
+    <p:spTree>
+      <p:nvGrpSpPr>
+        <p:cNvPr id="1" name=""/>
+        <p:cNvGrpSpPr/>
+        <p:nvPr/>
+      </p:nvGrpSpPr>
+      <p:grpSpPr>
+        <a:xfrm>
+          <a:off x="0" y="0"/>
+          <a:ext cx="0" cy="0"/>
+          <a:chOff x="0" y="0"/>
+          <a:chExt cx="0" cy="0"/>
+        </a:xfrm>
+      </p:grpSpPr>
+      <p:sp>
+        <p:nvSpPr>
+          <p:cNvPr id="2" name="Content Placeholder 1"/>
+          <p:cNvSpPr>
+            <a:spLocks noGrp="1"/>
+          </p:cNvSpPr>
+          <p:nvPr>
+            <p:ph idx="1"/>
+          </p:nvPr>
+        </p:nvSpPr>
+        <p:spPr/>
+        <p:txBody>
+          <a:bodyPr/>
+          <a:lstStyle/>
+          <a:p>
+            <a:r>
+              <a:rPr lang="en-GB" dirty="0" smtClean="0"/>
+              <a:t>New ranking algorithms comparison methodology</a:t>
+            </a:r>
+            <a:endParaRPr lang="en-GB" dirty="0"/>
+          </a:p>
+          <a:p>
+            <a:r>
+              <a:rPr lang="en-GB" dirty="0" smtClean="0"/>
+              <a:t>We found LRUF, </a:t>
+            </a:r>
+            <a:r>
+              <a:rPr lang="en-GB" dirty="0" err="1" smtClean="0"/>
+              <a:t>FSMRank</a:t>
+            </a:r>
+            <a:r>
+              <a:rPr lang="en-GB" dirty="0" smtClean="0"/>
+              <a:t>, </a:t>
+            </a:r>
+            <a:r>
+              <a:rPr lang="en-GB" dirty="0" err="1" smtClean="0"/>
+              <a:t>FenchelRank</a:t>
+            </a:r>
+            <a:r>
+              <a:rPr lang="en-GB" dirty="0" smtClean="0"/>
+              <a:t>, </a:t>
+            </a:r>
+            <a:r>
+              <a:rPr lang="en-GB" dirty="0" err="1" smtClean="0"/>
+              <a:t>SmoothRank</a:t>
+            </a:r>
+            <a:r>
+              <a:rPr lang="en-GB" dirty="0" smtClean="0"/>
+              <a:t> and </a:t>
+            </a:r>
+            <a:r>
+              <a:rPr lang="en-GB" dirty="0" err="1" smtClean="0"/>
+              <a:t>ListNet</a:t>
+            </a:r>
+            <a:r>
+              <a:rPr lang="en-GB" dirty="0" smtClean="0"/>
+              <a:t> to be the dominating Learning to Rank methods</a:t>
+            </a:r>
+            <a:endParaRPr lang="en-GB" dirty="0"/>
+          </a:p>
+          <a:p>
+            <a:r>
+              <a:rPr lang="en-GB" dirty="0" smtClean="0"/>
+              <a:t>High </a:t>
+            </a:r>
+            <a:r>
+              <a:rPr lang="en-GB" dirty="0" err="1" smtClean="0"/>
+              <a:t>MapReduce</a:t>
+            </a:r>
+            <a:r>
+              <a:rPr lang="en-GB" dirty="0" smtClean="0"/>
+              <a:t> job scheduling overhead: 150-200 seconds per iteration</a:t>
+            </a:r>
+          </a:p>
+          <a:p>
+            <a:r>
+              <a:rPr lang="en-GB" dirty="0" smtClean="0"/>
+              <a:t>Job scheduling overhead is independent of data set size</a:t>
+            </a:r>
+            <a:endParaRPr lang="en-GB" dirty="0"/>
+          </a:p>
+          <a:p>
+            <a:r>
+              <a:rPr lang="en-GB" dirty="0" smtClean="0"/>
+              <a:t>Single-machine </a:t>
+            </a:r>
+            <a:r>
+              <a:rPr lang="en-GB" dirty="0" err="1" smtClean="0"/>
+              <a:t>ListNet</a:t>
+            </a:r>
+            <a:r>
+              <a:rPr lang="en-GB" dirty="0" smtClean="0"/>
+              <a:t> does not scale well to data sets larger than physical memory</a:t>
+            </a:r>
+          </a:p>
+          <a:p>
+            <a:r>
+              <a:rPr lang="en-GB" dirty="0" err="1" smtClean="0"/>
+              <a:t>MapReduce</a:t>
+            </a:r>
+            <a:r>
+              <a:rPr lang="en-GB" dirty="0" smtClean="0"/>
+              <a:t> can increase processing speed of data sets larger than physical memory</a:t>
+            </a:r>
+          </a:p>
+          <a:p>
+            <a:r>
+              <a:rPr lang="en-GB" dirty="0" smtClean="0"/>
+              <a:t>A normalisation </a:t>
+            </a:r>
+            <a:r>
+              <a:rPr lang="en-GB" dirty="0" err="1" smtClean="0"/>
+              <a:t>preprocessing</a:t>
+            </a:r>
+            <a:r>
+              <a:rPr lang="en-GB" dirty="0" smtClean="0"/>
+              <a:t> step improves the convergence rate of </a:t>
+            </a:r>
+            <a:r>
+              <a:rPr lang="en-GB" dirty="0" err="1" smtClean="0"/>
+              <a:t>ListNet</a:t>
+            </a:r>
+            <a:endParaRPr lang="en-GB" dirty="0"/>
+          </a:p>
+        </p:txBody>
+      </p:sp>
+      <p:sp>
+        <p:nvSpPr>
+          <p:cNvPr id="3" name="Text Placeholder 2"/>
+          <p:cNvSpPr>
+            <a:spLocks noGrp="1"/>
+          </p:cNvSpPr>
+          <p:nvPr>
+            <p:ph type="body" sz="quarter" idx="13"/>
+          </p:nvPr>
+        </p:nvSpPr>
+        <p:spPr/>
+        <p:txBody>
+          <a:bodyPr/>
+          <a:lstStyle/>
+          <a:p>
+            <a:r>
+              <a:rPr lang="en-GB" dirty="0" smtClean="0"/>
+              <a:t>Conclusions &amp; Contributions</a:t>
+            </a:r>
+            <a:endParaRPr lang="en-GB" dirty="0"/>
+          </a:p>
+        </p:txBody>
+      </p:sp>
+      <p:sp>
+        <p:nvSpPr>
+          <p:cNvPr id="4" name="Text Placeholder 3"/>
+          <p:cNvSpPr>
+            <a:spLocks noGrp="1"/>
+          </p:cNvSpPr>
+          <p:nvPr>
+            <p:ph type="body" sz="quarter" idx="14"/>
+          </p:nvPr>
+        </p:nvSpPr>
+        <p:spPr/>
+        <p:txBody>
+          <a:bodyPr/>
+          <a:lstStyle/>
+          <a:p>
+            <a:endParaRPr lang="en-GB"/>
+          </a:p>
+        </p:txBody>
+      </p:sp>
+    </p:spTree>
+    <p:extLst>
+      <p:ext uri="{BB962C8B-B14F-4D97-AF65-F5344CB8AC3E}">
+        <p14:creationId xmlns:p14="http://schemas.microsoft.com/office/powerpoint/2010/main" val="2551529915"/>
+      </p:ext>
+    </p:extLst>
+  </p:cSld>
+  <p:clrMapOvr>
+    <a:masterClrMapping/>
+  </p:clrMapOvr>
+  <p:timing>
+    <p:tnLst>
+      <p:par>
+        <p:cTn id="1" dur="indefinite" restart="never" nodeType="tmRoot"/>
+      </p:par>
+    </p:tnLst>
+  </p:timing>
+</p:sld>
+</file>
+
+<file path=ppt/slides/slide29.xml><?xml version="1.0" encoding="utf-8"?>
+<p:sld xmlns:a="http://schemas.openxmlformats.org/drawingml/2006/main" xmlns:r="http://schemas.openxmlformats.org/officeDocument/2006/relationships" xmlns:p="http://schemas.openxmlformats.org/presentationml/2006/main">
+  <p:cSld>
+    <p:spTree>
+      <p:nvGrpSpPr>
+        <p:cNvPr id="1" name=""/>
+        <p:cNvGrpSpPr/>
+        <p:nvPr/>
+      </p:nvGrpSpPr>
+      <p:grpSpPr>
+        <a:xfrm>
+          <a:off x="0" y="0"/>
+          <a:ext cx="0" cy="0"/>
+          <a:chOff x="0" y="0"/>
+          <a:chExt cx="0" cy="0"/>
+        </a:xfrm>
+      </p:grpSpPr>
+      <p:sp>
+        <p:nvSpPr>
+          <p:cNvPr id="2" name="Content Placeholder 1"/>
+          <p:cNvSpPr>
+            <a:spLocks noGrp="1"/>
+          </p:cNvSpPr>
+          <p:nvPr>
+            <p:ph idx="1"/>
+          </p:nvPr>
+        </p:nvSpPr>
+        <p:spPr/>
+        <p:txBody>
+          <a:bodyPr/>
+          <a:lstStyle/>
+          <a:p>
+            <a:r>
+              <a:rPr lang="en-GB" dirty="0" smtClean="0"/>
+              <a:t>Distributed computing models</a:t>
+            </a:r>
+          </a:p>
+          <a:p>
+            <a:r>
+              <a:rPr lang="en-GB" dirty="0" smtClean="0"/>
+              <a:t>Learning to Rank algorithms</a:t>
+            </a:r>
+          </a:p>
+          <a:p>
+            <a:r>
+              <a:rPr lang="en-GB" dirty="0" smtClean="0"/>
+              <a:t>Optimisation algorithms</a:t>
+            </a:r>
+            <a:endParaRPr lang="en-GB" dirty="0"/>
+          </a:p>
+        </p:txBody>
+      </p:sp>
+      <p:sp>
+        <p:nvSpPr>
+          <p:cNvPr id="3" name="Text Placeholder 2"/>
+          <p:cNvSpPr>
+            <a:spLocks noGrp="1"/>
+          </p:cNvSpPr>
+          <p:nvPr>
+            <p:ph type="body" sz="quarter" idx="13"/>
+          </p:nvPr>
+        </p:nvSpPr>
+        <p:spPr/>
+        <p:txBody>
+          <a:bodyPr/>
+          <a:lstStyle/>
+          <a:p>
+            <a:r>
+              <a:rPr lang="en-GB" dirty="0" smtClean="0"/>
+              <a:t>Future work</a:t>
+            </a:r>
+            <a:endParaRPr lang="en-GB" dirty="0"/>
+          </a:p>
+        </p:txBody>
+      </p:sp>
+      <p:sp>
+        <p:nvSpPr>
+          <p:cNvPr id="4" name="Text Placeholder 3"/>
+          <p:cNvSpPr>
+            <a:spLocks noGrp="1"/>
+          </p:cNvSpPr>
+          <p:nvPr>
+            <p:ph type="body" sz="quarter" idx="14"/>
+          </p:nvPr>
+        </p:nvSpPr>
+        <p:spPr/>
+        <p:txBody>
+          <a:bodyPr/>
+          <a:lstStyle/>
+          <a:p>
+            <a:endParaRPr lang="en-GB"/>
+          </a:p>
+        </p:txBody>
+      </p:sp>
+    </p:spTree>
+    <p:extLst>
+      <p:ext uri="{BB962C8B-B14F-4D97-AF65-F5344CB8AC3E}">
+        <p14:creationId xmlns:p14="http://schemas.microsoft.com/office/powerpoint/2010/main" val="4159291697"/>
+      </p:ext>
+    </p:extLst>
+  </p:cSld>
+  <p:clrMapOvr>
+    <a:masterClrMapping/>
+  </p:clrMapOvr>
+  <p:timing>
+    <p:tnLst>
+      <p:par>
+        <p:cTn id="1" dur="indefinite" restart="never" nodeType="tmRoot"/>
+      </p:par>
+    </p:tnLst>
+  </p:timing>
+</p:sld>
+</file>
+
+<file path=ppt/slides/slide3.xml><?xml version="1.0" encoding="utf-8"?>
+<p:sld xmlns:a="http://schemas.openxmlformats.org/drawingml/2006/main" xmlns:r="http://schemas.openxmlformats.org/officeDocument/2006/relationships" xmlns:p="http://schemas.openxmlformats.org/presentationml/2006/main">
+  <p:cSld>
+    <p:spTree>
+      <p:nvGrpSpPr>
+        <p:cNvPr id="1" name=""/>
+        <p:cNvGrpSpPr/>
+        <p:nvPr/>
+      </p:nvGrpSpPr>
+      <p:grpSpPr>
+        <a:xfrm>
+          <a:off x="0" y="0"/>
+          <a:ext cx="0" cy="0"/>
+          <a:chOff x="0" y="0"/>
+          <a:chExt cx="0" cy="0"/>
+        </a:xfrm>
+      </p:grpSpPr>
+      <p:pic>
+        <p:nvPicPr>
+          <p:cNvPr id="5" name="Content Placeholder 4"/>
+          <p:cNvPicPr>
+            <a:picLocks noGrp="1" noChangeAspect="1"/>
+          </p:cNvPicPr>
+          <p:nvPr>
+            <p:ph idx="1"/>
+          </p:nvPr>
+        </p:nvPicPr>
+        <p:blipFill>
+          <a:blip r:embed="rId2">
+            <a:extLst>
+              <a:ext uri="{28A0092B-C50C-407E-A947-70E740481C1C}">
+                <a14:useLocalDpi xmlns:a14="http://schemas.microsoft.com/office/drawing/2010/main" val="0"/>
+              </a:ext>
+            </a:extLst>
+          </a:blip>
+          <a:stretch>
+            <a:fillRect/>
+          </a:stretch>
+        </p:blipFill>
+        <p:spPr>
+          <a:xfrm>
+            <a:off x="533401" y="1308100"/>
+            <a:ext cx="8661397" cy="4330699"/>
+          </a:xfrm>
+        </p:spPr>
+      </p:pic>
+    </p:spTree>
+    <p:extLst>
+      <p:ext uri="{BB962C8B-B14F-4D97-AF65-F5344CB8AC3E}">
+        <p14:creationId xmlns:p14="http://schemas.microsoft.com/office/powerpoint/2010/main" val="2466025656"/>
+      </p:ext>
+    </p:extLst>
+  </p:cSld>
+  <p:clrMapOvr>
+    <a:masterClrMapping/>
+  </p:clrMapOvr>
+  <p:timing>
+    <p:tnLst>
+      <p:par>
+        <p:cTn id="1" dur="indefinite" restart="never" nodeType="tmRoot"/>
+      </p:par>
+    </p:tnLst>
+  </p:timing>
+</p:sld>
+</file>
+
+<file path=ppt/slides/slide4.xml><?xml version="1.0" encoding="utf-8"?>
+<p:sld xmlns:a="http://schemas.openxmlformats.org/drawingml/2006/main" xmlns:r="http://schemas.openxmlformats.org/officeDocument/2006/relationships" xmlns:p="http://schemas.openxmlformats.org/presentationml/2006/main">
+  <p:cSld>
+    <p:spTree>
+      <p:nvGrpSpPr>
+        <p:cNvPr id="1" name=""/>
+        <p:cNvGrpSpPr/>
+        <p:nvPr/>
+      </p:nvGrpSpPr>
+      <p:grpSpPr>
+        <a:xfrm>
+          <a:off x="0" y="0"/>
+          <a:ext cx="0" cy="0"/>
+          <a:chOff x="0" y="0"/>
+          <a:chExt cx="0" cy="0"/>
+        </a:xfrm>
+      </p:grpSpPr>
+      <p:pic>
+        <p:nvPicPr>
+          <p:cNvPr id="5" name="Content Placeholder 4"/>
+          <p:cNvPicPr>
+            <a:picLocks noGrp="1" noChangeAspect="1"/>
+          </p:cNvPicPr>
+          <p:nvPr>
+            <p:ph idx="1"/>
+          </p:nvPr>
+        </p:nvPicPr>
+        <p:blipFill>
+          <a:blip r:embed="rId2">
+            <a:extLst>
+              <a:ext uri="{28A0092B-C50C-407E-A947-70E740481C1C}">
+                <a14:useLocalDpi xmlns:a14="http://schemas.microsoft.com/office/drawing/2010/main" val="0"/>
+              </a:ext>
+            </a:extLst>
+          </a:blip>
+          <a:stretch>
+            <a:fillRect/>
+          </a:stretch>
+        </p:blipFill>
+        <p:spPr>
+          <a:xfrm>
+            <a:off x="533401" y="1308100"/>
+            <a:ext cx="8661397" cy="4330699"/>
+          </a:xfrm>
+        </p:spPr>
+      </p:pic>
+    </p:spTree>
+    <p:extLst>
+      <p:ext uri="{BB962C8B-B14F-4D97-AF65-F5344CB8AC3E}">
+        <p14:creationId xmlns:p14="http://schemas.microsoft.com/office/powerpoint/2010/main" val="3386488938"/>
+      </p:ext>
+    </p:extLst>
+  </p:cSld>
+  <p:clrMapOvr>
+    <a:masterClrMapping/>
+  </p:clrMapOvr>
+  <p:timing>
+    <p:tnLst>
+      <p:par>
+        <p:cTn id="1" dur="indefinite" restart="never" nodeType="tmRoot"/>
+      </p:par>
+    </p:tnLst>
+  </p:timing>
+</p:sld>
+</file>
+
+<file path=ppt/slides/slide5.xml><?xml version="1.0" encoding="utf-8"?>
 <p:sld xmlns:a="http://schemas.openxmlformats.org/drawingml/2006/main" xmlns:r="http://schemas.openxmlformats.org/officeDocument/2006/relationships" xmlns:p="http://schemas.openxmlformats.org/presentationml/2006/main">
   <p:cSld>
     <p:spTree>
@@ -7214,740 +8509,7 @@
 </p:sld>
 </file>
 
-<file path=ppt/slides/slide20.xml><?xml version="1.0" encoding="utf-8"?>
-<p:sld xmlns:a="http://schemas.openxmlformats.org/drawingml/2006/main" xmlns:r="http://schemas.openxmlformats.org/officeDocument/2006/relationships" xmlns:p="http://schemas.openxmlformats.org/presentationml/2006/main">
-  <p:cSld>
-    <p:spTree>
-      <p:nvGrpSpPr>
-        <p:cNvPr id="1" name=""/>
-        <p:cNvGrpSpPr/>
-        <p:nvPr/>
-      </p:nvGrpSpPr>
-      <p:grpSpPr>
-        <a:xfrm>
-          <a:off x="0" y="0"/>
-          <a:ext cx="0" cy="0"/>
-          <a:chOff x="0" y="0"/>
-          <a:chExt cx="0" cy="0"/>
-        </a:xfrm>
-      </p:grpSpPr>
-      <p:pic>
-        <p:nvPicPr>
-          <p:cNvPr id="5" name="Content Placeholder 4"/>
-          <p:cNvPicPr>
-            <a:picLocks noGrp="1" noChangeAspect="1"/>
-          </p:cNvPicPr>
-          <p:nvPr>
-            <p:ph idx="1"/>
-          </p:nvPr>
-        </p:nvPicPr>
-        <p:blipFill>
-          <a:blip r:embed="rId2" cstate="print">
-            <a:extLst>
-              <a:ext uri="{28A0092B-C50C-407E-A947-70E740481C1C}">
-                <a14:useLocalDpi xmlns:a14="http://schemas.microsoft.com/office/drawing/2010/main" val="0"/>
-              </a:ext>
-            </a:extLst>
-          </a:blip>
-          <a:stretch>
-            <a:fillRect/>
-          </a:stretch>
-        </p:blipFill>
-        <p:spPr>
-          <a:xfrm>
-            <a:off x="1082887" y="1982176"/>
-            <a:ext cx="7785181" cy="3198382"/>
-          </a:xfrm>
-        </p:spPr>
-      </p:pic>
-      <p:sp>
-        <p:nvSpPr>
-          <p:cNvPr id="3" name="Text Placeholder 2"/>
-          <p:cNvSpPr>
-            <a:spLocks noGrp="1"/>
-          </p:cNvSpPr>
-          <p:nvPr>
-            <p:ph type="body" sz="quarter" idx="13"/>
-          </p:nvPr>
-        </p:nvSpPr>
-        <p:spPr/>
-        <p:txBody>
-          <a:bodyPr/>
-          <a:lstStyle/>
-          <a:p>
-            <a:r>
-              <a:rPr lang="en-GB" dirty="0" err="1" smtClean="0"/>
-              <a:t>MapReduce</a:t>
-            </a:r>
-            <a:endParaRPr lang="en-GB" dirty="0"/>
-          </a:p>
-        </p:txBody>
-      </p:sp>
-      <p:sp>
-        <p:nvSpPr>
-          <p:cNvPr id="4" name="Text Placeholder 3"/>
-          <p:cNvSpPr>
-            <a:spLocks noGrp="1"/>
-          </p:cNvSpPr>
-          <p:nvPr>
-            <p:ph type="body" sz="quarter" idx="14"/>
-          </p:nvPr>
-        </p:nvSpPr>
-        <p:spPr/>
-        <p:txBody>
-          <a:bodyPr/>
-          <a:lstStyle/>
-          <a:p>
-            <a:endParaRPr lang="en-GB"/>
-          </a:p>
-        </p:txBody>
-      </p:sp>
-    </p:spTree>
-    <p:extLst>
-      <p:ext uri="{BB962C8B-B14F-4D97-AF65-F5344CB8AC3E}">
-        <p14:creationId xmlns:p14="http://schemas.microsoft.com/office/powerpoint/2010/main" val="798841358"/>
-      </p:ext>
-    </p:extLst>
-  </p:cSld>
-  <p:clrMapOvr>
-    <a:masterClrMapping/>
-  </p:clrMapOvr>
-  <p:timing>
-    <p:tnLst>
-      <p:par>
-        <p:cTn id="1" dur="indefinite" restart="never" nodeType="tmRoot"/>
-      </p:par>
-    </p:tnLst>
-  </p:timing>
-</p:sld>
-</file>
-
-<file path=ppt/slides/slide21.xml><?xml version="1.0" encoding="utf-8"?>
-<p:sld xmlns:a="http://schemas.openxmlformats.org/drawingml/2006/main" xmlns:r="http://schemas.openxmlformats.org/officeDocument/2006/relationships" xmlns:p="http://schemas.openxmlformats.org/presentationml/2006/main">
-  <p:cSld>
-    <p:spTree>
-      <p:nvGrpSpPr>
-        <p:cNvPr id="1" name=""/>
-        <p:cNvGrpSpPr/>
-        <p:nvPr/>
-      </p:nvGrpSpPr>
-      <p:grpSpPr>
-        <a:xfrm>
-          <a:off x="0" y="0"/>
-          <a:ext cx="0" cy="0"/>
-          <a:chOff x="0" y="0"/>
-          <a:chExt cx="0" cy="0"/>
-        </a:xfrm>
-      </p:grpSpPr>
-      <p:pic>
-        <p:nvPicPr>
-          <p:cNvPr id="5" name="Content Placeholder 4"/>
-          <p:cNvPicPr>
-            <a:picLocks noGrp="1" noChangeAspect="1"/>
-          </p:cNvPicPr>
-          <p:nvPr>
-            <p:ph idx="1"/>
-          </p:nvPr>
-        </p:nvPicPr>
-        <p:blipFill>
-          <a:blip r:embed="rId2">
-            <a:extLst>
-              <a:ext uri="{28A0092B-C50C-407E-A947-70E740481C1C}">
-                <a14:useLocalDpi xmlns:a14="http://schemas.microsoft.com/office/drawing/2010/main" val="0"/>
-              </a:ext>
-            </a:extLst>
-          </a:blip>
-          <a:stretch>
-            <a:fillRect/>
-          </a:stretch>
-        </p:blipFill>
-        <p:spPr>
-          <a:xfrm>
-            <a:off x="1079500" y="2312717"/>
-            <a:ext cx="7800975" cy="3037429"/>
-          </a:xfrm>
-        </p:spPr>
-      </p:pic>
-      <p:sp>
-        <p:nvSpPr>
-          <p:cNvPr id="3" name="Text Placeholder 2"/>
-          <p:cNvSpPr>
-            <a:spLocks noGrp="1"/>
-          </p:cNvSpPr>
-          <p:nvPr>
-            <p:ph type="body" sz="quarter" idx="13"/>
-          </p:nvPr>
-        </p:nvSpPr>
-        <p:spPr/>
-        <p:txBody>
-          <a:bodyPr/>
-          <a:lstStyle/>
-          <a:p>
-            <a:r>
-              <a:rPr lang="en-GB" dirty="0" err="1" smtClean="0"/>
-              <a:t>Preprocessing</a:t>
-            </a:r>
-            <a:endParaRPr lang="en-GB" dirty="0"/>
-          </a:p>
-        </p:txBody>
-      </p:sp>
-      <p:sp>
-        <p:nvSpPr>
-          <p:cNvPr id="4" name="Text Placeholder 3"/>
-          <p:cNvSpPr>
-            <a:spLocks noGrp="1"/>
-          </p:cNvSpPr>
-          <p:nvPr>
-            <p:ph type="body" sz="quarter" idx="14"/>
-          </p:nvPr>
-        </p:nvSpPr>
-        <p:spPr/>
-        <p:txBody>
-          <a:bodyPr/>
-          <a:lstStyle/>
-          <a:p>
-            <a:endParaRPr lang="en-GB"/>
-          </a:p>
-        </p:txBody>
-      </p:sp>
-    </p:spTree>
-    <p:extLst>
-      <p:ext uri="{BB962C8B-B14F-4D97-AF65-F5344CB8AC3E}">
-        <p14:creationId xmlns:p14="http://schemas.microsoft.com/office/powerpoint/2010/main" val="1561782756"/>
-      </p:ext>
-    </p:extLst>
-  </p:cSld>
-  <p:clrMapOvr>
-    <a:masterClrMapping/>
-  </p:clrMapOvr>
-  <p:timing>
-    <p:tnLst>
-      <p:par>
-        <p:cTn id="1" dur="indefinite" restart="never" nodeType="tmRoot"/>
-      </p:par>
-    </p:tnLst>
-  </p:timing>
-</p:sld>
-</file>
-
-<file path=ppt/slides/slide22.xml><?xml version="1.0" encoding="utf-8"?>
-<p:sld xmlns:a="http://schemas.openxmlformats.org/drawingml/2006/main" xmlns:r="http://schemas.openxmlformats.org/officeDocument/2006/relationships" xmlns:p="http://schemas.openxmlformats.org/presentationml/2006/main">
-  <p:cSld>
-    <p:spTree>
-      <p:nvGrpSpPr>
-        <p:cNvPr id="1" name=""/>
-        <p:cNvGrpSpPr/>
-        <p:nvPr/>
-      </p:nvGrpSpPr>
-      <p:grpSpPr>
-        <a:xfrm>
-          <a:off x="0" y="0"/>
-          <a:ext cx="0" cy="0"/>
-          <a:chOff x="0" y="0"/>
-          <a:chExt cx="0" cy="0"/>
-        </a:xfrm>
-      </p:grpSpPr>
-      <p:pic>
-        <p:nvPicPr>
-          <p:cNvPr id="5" name="Content Placeholder 4"/>
-          <p:cNvPicPr>
-            <a:picLocks noGrp="1" noChangeAspect="1"/>
-          </p:cNvPicPr>
-          <p:nvPr>
-            <p:ph idx="1"/>
-          </p:nvPr>
-        </p:nvPicPr>
-        <p:blipFill>
-          <a:blip r:embed="rId2" cstate="print">
-            <a:extLst>
-              <a:ext uri="{28A0092B-C50C-407E-A947-70E740481C1C}">
-                <a14:useLocalDpi xmlns:a14="http://schemas.microsoft.com/office/drawing/2010/main" val="0"/>
-              </a:ext>
-            </a:extLst>
-          </a:blip>
-          <a:stretch>
-            <a:fillRect/>
-          </a:stretch>
-        </p:blipFill>
-        <p:spPr>
-          <a:xfrm>
-            <a:off x="762000" y="152400"/>
-            <a:ext cx="6096000" cy="6200765"/>
-          </a:xfrm>
-        </p:spPr>
-      </p:pic>
-    </p:spTree>
-    <p:extLst>
-      <p:ext uri="{BB962C8B-B14F-4D97-AF65-F5344CB8AC3E}">
-        <p14:creationId xmlns:p14="http://schemas.microsoft.com/office/powerpoint/2010/main" val="3552708193"/>
-      </p:ext>
-    </p:extLst>
-  </p:cSld>
-  <p:clrMapOvr>
-    <a:masterClrMapping/>
-  </p:clrMapOvr>
-  <p:timing>
-    <p:tnLst>
-      <p:par>
-        <p:cTn id="1" dur="indefinite" restart="never" nodeType="tmRoot"/>
-      </p:par>
-    </p:tnLst>
-  </p:timing>
-</p:sld>
-</file>
-
-<file path=ppt/slides/slide23.xml><?xml version="1.0" encoding="utf-8"?>
-<p:sld xmlns:a="http://schemas.openxmlformats.org/drawingml/2006/main" xmlns:r="http://schemas.openxmlformats.org/officeDocument/2006/relationships" xmlns:p="http://schemas.openxmlformats.org/presentationml/2006/main">
-  <p:cSld>
-    <p:spTree>
-      <p:nvGrpSpPr>
-        <p:cNvPr id="1" name=""/>
-        <p:cNvGrpSpPr/>
-        <p:nvPr/>
-      </p:nvGrpSpPr>
-      <p:grpSpPr>
-        <a:xfrm>
-          <a:off x="0" y="0"/>
-          <a:ext cx="0" cy="0"/>
-          <a:chOff x="0" y="0"/>
-          <a:chExt cx="0" cy="0"/>
-        </a:xfrm>
-      </p:grpSpPr>
-      <p:pic>
-        <p:nvPicPr>
-          <p:cNvPr id="5" name="Content Placeholder 4"/>
-          <p:cNvPicPr>
-            <a:picLocks noGrp="1" noChangeAspect="1"/>
-          </p:cNvPicPr>
-          <p:nvPr>
-            <p:ph idx="1"/>
-          </p:nvPr>
-        </p:nvPicPr>
-        <p:blipFill>
-          <a:blip r:embed="rId2">
-            <a:extLst>
-              <a:ext uri="{28A0092B-C50C-407E-A947-70E740481C1C}">
-                <a14:useLocalDpi xmlns:a14="http://schemas.microsoft.com/office/drawing/2010/main" val="0"/>
-              </a:ext>
-            </a:extLst>
-          </a:blip>
-          <a:stretch>
-            <a:fillRect/>
-          </a:stretch>
-        </p:blipFill>
-        <p:spPr>
-          <a:xfrm>
-            <a:off x="533400" y="228600"/>
-            <a:ext cx="6062291" cy="6019800"/>
-          </a:xfrm>
-        </p:spPr>
-      </p:pic>
-    </p:spTree>
-    <p:extLst>
-      <p:ext uri="{BB962C8B-B14F-4D97-AF65-F5344CB8AC3E}">
-        <p14:creationId xmlns:p14="http://schemas.microsoft.com/office/powerpoint/2010/main" val="3619904879"/>
-      </p:ext>
-    </p:extLst>
-  </p:cSld>
-  <p:clrMapOvr>
-    <a:masterClrMapping/>
-  </p:clrMapOvr>
-  <p:timing>
-    <p:tnLst>
-      <p:par>
-        <p:cTn id="1" dur="indefinite" restart="never" nodeType="tmRoot"/>
-      </p:par>
-    </p:tnLst>
-  </p:timing>
-</p:sld>
-</file>
-
-<file path=ppt/slides/slide24.xml><?xml version="1.0" encoding="utf-8"?>
-<p:sld xmlns:a="http://schemas.openxmlformats.org/drawingml/2006/main" xmlns:r="http://schemas.openxmlformats.org/officeDocument/2006/relationships" xmlns:p="http://schemas.openxmlformats.org/presentationml/2006/main">
-  <p:cSld>
-    <p:spTree>
-      <p:nvGrpSpPr>
-        <p:cNvPr id="1" name=""/>
-        <p:cNvGrpSpPr/>
-        <p:nvPr/>
-      </p:nvGrpSpPr>
-      <p:grpSpPr>
-        <a:xfrm>
-          <a:off x="0" y="0"/>
-          <a:ext cx="0" cy="0"/>
-          <a:chOff x="0" y="0"/>
-          <a:chExt cx="0" cy="0"/>
-        </a:xfrm>
-      </p:grpSpPr>
-      <p:pic>
-        <p:nvPicPr>
-          <p:cNvPr id="5" name="Content Placeholder 4"/>
-          <p:cNvPicPr>
-            <a:picLocks noGrp="1" noChangeAspect="1"/>
-          </p:cNvPicPr>
-          <p:nvPr>
-            <p:ph idx="1"/>
-          </p:nvPr>
-        </p:nvPicPr>
-        <p:blipFill>
-          <a:blip r:embed="rId2" cstate="print">
-            <a:extLst>
-              <a:ext uri="{28A0092B-C50C-407E-A947-70E740481C1C}">
-                <a14:useLocalDpi xmlns:a14="http://schemas.microsoft.com/office/drawing/2010/main" val="0"/>
-              </a:ext>
-            </a:extLst>
-          </a:blip>
-          <a:stretch>
-            <a:fillRect/>
-          </a:stretch>
-        </p:blipFill>
-        <p:spPr>
-          <a:xfrm>
-            <a:off x="457200" y="228600"/>
-            <a:ext cx="6005401" cy="6096000"/>
-          </a:xfrm>
-        </p:spPr>
-      </p:pic>
-    </p:spTree>
-    <p:extLst>
-      <p:ext uri="{BB962C8B-B14F-4D97-AF65-F5344CB8AC3E}">
-        <p14:creationId xmlns:p14="http://schemas.microsoft.com/office/powerpoint/2010/main" val="3222599415"/>
-      </p:ext>
-    </p:extLst>
-  </p:cSld>
-  <p:clrMapOvr>
-    <a:masterClrMapping/>
-  </p:clrMapOvr>
-  <p:timing>
-    <p:tnLst>
-      <p:par>
-        <p:cTn id="1" dur="indefinite" restart="never" nodeType="tmRoot"/>
-      </p:par>
-    </p:tnLst>
-  </p:timing>
-</p:sld>
-</file>
-
-<file path=ppt/slides/slide25.xml><?xml version="1.0" encoding="utf-8"?>
-<p:sld xmlns:a="http://schemas.openxmlformats.org/drawingml/2006/main" xmlns:r="http://schemas.openxmlformats.org/officeDocument/2006/relationships" xmlns:p="http://schemas.openxmlformats.org/presentationml/2006/main">
-  <p:cSld>
-    <p:spTree>
-      <p:nvGrpSpPr>
-        <p:cNvPr id="1" name=""/>
-        <p:cNvGrpSpPr/>
-        <p:nvPr/>
-      </p:nvGrpSpPr>
-      <p:grpSpPr>
-        <a:xfrm>
-          <a:off x="0" y="0"/>
-          <a:ext cx="0" cy="0"/>
-          <a:chOff x="0" y="0"/>
-          <a:chExt cx="0" cy="0"/>
-        </a:xfrm>
-      </p:grpSpPr>
-      <p:sp>
-        <p:nvSpPr>
-          <p:cNvPr id="2" name="Content Placeholder 1"/>
-          <p:cNvSpPr>
-            <a:spLocks noGrp="1"/>
-          </p:cNvSpPr>
-          <p:nvPr>
-            <p:ph idx="1"/>
-          </p:nvPr>
-        </p:nvSpPr>
-        <p:spPr/>
-        <p:txBody>
-          <a:bodyPr/>
-          <a:lstStyle/>
-          <a:p>
-            <a:r>
-              <a:rPr lang="en-GB" dirty="0" smtClean="0"/>
-              <a:t>New ranking algorithms comparison methodology</a:t>
-            </a:r>
-            <a:endParaRPr lang="en-GB" dirty="0"/>
-          </a:p>
-          <a:p>
-            <a:r>
-              <a:rPr lang="en-GB" dirty="0" smtClean="0"/>
-              <a:t>We found LRUF, </a:t>
-            </a:r>
-            <a:r>
-              <a:rPr lang="en-GB" dirty="0" err="1" smtClean="0"/>
-              <a:t>FSMRank</a:t>
-            </a:r>
-            <a:r>
-              <a:rPr lang="en-GB" dirty="0" smtClean="0"/>
-              <a:t>, </a:t>
-            </a:r>
-            <a:r>
-              <a:rPr lang="en-GB" dirty="0" err="1" smtClean="0"/>
-              <a:t>FenchelRank</a:t>
-            </a:r>
-            <a:r>
-              <a:rPr lang="en-GB" dirty="0" smtClean="0"/>
-              <a:t>, </a:t>
-            </a:r>
-            <a:r>
-              <a:rPr lang="en-GB" dirty="0" err="1" smtClean="0"/>
-              <a:t>SmoothRank</a:t>
-            </a:r>
-            <a:r>
-              <a:rPr lang="en-GB" dirty="0" smtClean="0"/>
-              <a:t> and </a:t>
-            </a:r>
-            <a:r>
-              <a:rPr lang="en-GB" dirty="0" err="1" smtClean="0"/>
-              <a:t>ListNet</a:t>
-            </a:r>
-            <a:r>
-              <a:rPr lang="en-GB" dirty="0" smtClean="0"/>
-              <a:t> to be the dominating Learning to Rank methods</a:t>
-            </a:r>
-            <a:endParaRPr lang="en-GB" dirty="0"/>
-          </a:p>
-          <a:p>
-            <a:r>
-              <a:rPr lang="en-GB" dirty="0" smtClean="0"/>
-              <a:t>High </a:t>
-            </a:r>
-            <a:r>
-              <a:rPr lang="en-GB" dirty="0" err="1" smtClean="0"/>
-              <a:t>MapReduce</a:t>
-            </a:r>
-            <a:r>
-              <a:rPr lang="en-GB" dirty="0" smtClean="0"/>
-              <a:t> job scheduling overhead: 150-200 seconds per iteration</a:t>
-            </a:r>
-          </a:p>
-          <a:p>
-            <a:r>
-              <a:rPr lang="en-GB" dirty="0" smtClean="0"/>
-              <a:t>Job scheduling overhead is independent of data set size</a:t>
-            </a:r>
-            <a:endParaRPr lang="en-GB" dirty="0"/>
-          </a:p>
-          <a:p>
-            <a:r>
-              <a:rPr lang="en-GB" dirty="0" smtClean="0"/>
-              <a:t>Single-machine </a:t>
-            </a:r>
-            <a:r>
-              <a:rPr lang="en-GB" dirty="0" err="1" smtClean="0"/>
-              <a:t>ListNet</a:t>
-            </a:r>
-            <a:r>
-              <a:rPr lang="en-GB" dirty="0" smtClean="0"/>
-              <a:t> does not scale well to data sets larger than physical memory</a:t>
-            </a:r>
-          </a:p>
-          <a:p>
-            <a:r>
-              <a:rPr lang="en-GB" dirty="0" err="1" smtClean="0"/>
-              <a:t>MapReduce</a:t>
-            </a:r>
-            <a:r>
-              <a:rPr lang="en-GB" dirty="0" smtClean="0"/>
-              <a:t> can increase processing speed of data sets larger than physical memory</a:t>
-            </a:r>
-          </a:p>
-          <a:p>
-            <a:r>
-              <a:rPr lang="en-GB" dirty="0" smtClean="0"/>
-              <a:t>A normalisation </a:t>
-            </a:r>
-            <a:r>
-              <a:rPr lang="en-GB" dirty="0" err="1" smtClean="0"/>
-              <a:t>preprocessing</a:t>
-            </a:r>
-            <a:r>
-              <a:rPr lang="en-GB" dirty="0" smtClean="0"/>
-              <a:t> step improves the convergence rate of </a:t>
-            </a:r>
-            <a:r>
-              <a:rPr lang="en-GB" dirty="0" err="1" smtClean="0"/>
-              <a:t>ListNet</a:t>
-            </a:r>
-            <a:endParaRPr lang="en-GB" dirty="0"/>
-          </a:p>
-        </p:txBody>
-      </p:sp>
-      <p:sp>
-        <p:nvSpPr>
-          <p:cNvPr id="3" name="Text Placeholder 2"/>
-          <p:cNvSpPr>
-            <a:spLocks noGrp="1"/>
-          </p:cNvSpPr>
-          <p:nvPr>
-            <p:ph type="body" sz="quarter" idx="13"/>
-          </p:nvPr>
-        </p:nvSpPr>
-        <p:spPr/>
-        <p:txBody>
-          <a:bodyPr/>
-          <a:lstStyle/>
-          <a:p>
-            <a:r>
-              <a:rPr lang="en-GB" dirty="0" smtClean="0"/>
-              <a:t>Conclusions &amp; Contributions</a:t>
-            </a:r>
-            <a:endParaRPr lang="en-GB" dirty="0"/>
-          </a:p>
-        </p:txBody>
-      </p:sp>
-      <p:sp>
-        <p:nvSpPr>
-          <p:cNvPr id="4" name="Text Placeholder 3"/>
-          <p:cNvSpPr>
-            <a:spLocks noGrp="1"/>
-          </p:cNvSpPr>
-          <p:nvPr>
-            <p:ph type="body" sz="quarter" idx="14"/>
-          </p:nvPr>
-        </p:nvSpPr>
-        <p:spPr/>
-        <p:txBody>
-          <a:bodyPr/>
-          <a:lstStyle/>
-          <a:p>
-            <a:endParaRPr lang="en-GB"/>
-          </a:p>
-        </p:txBody>
-      </p:sp>
-    </p:spTree>
-    <p:extLst>
-      <p:ext uri="{BB962C8B-B14F-4D97-AF65-F5344CB8AC3E}">
-        <p14:creationId xmlns:p14="http://schemas.microsoft.com/office/powerpoint/2010/main" val="2551529915"/>
-      </p:ext>
-    </p:extLst>
-  </p:cSld>
-  <p:clrMapOvr>
-    <a:masterClrMapping/>
-  </p:clrMapOvr>
-  <p:timing>
-    <p:tnLst>
-      <p:par>
-        <p:cTn id="1" dur="indefinite" restart="never" nodeType="tmRoot"/>
-      </p:par>
-    </p:tnLst>
-  </p:timing>
-</p:sld>
-</file>
-
-<file path=ppt/slides/slide26.xml><?xml version="1.0" encoding="utf-8"?>
-<p:sld xmlns:a="http://schemas.openxmlformats.org/drawingml/2006/main" xmlns:r="http://schemas.openxmlformats.org/officeDocument/2006/relationships" xmlns:p="http://schemas.openxmlformats.org/presentationml/2006/main">
-  <p:cSld>
-    <p:spTree>
-      <p:nvGrpSpPr>
-        <p:cNvPr id="1" name=""/>
-        <p:cNvGrpSpPr/>
-        <p:nvPr/>
-      </p:nvGrpSpPr>
-      <p:grpSpPr>
-        <a:xfrm>
-          <a:off x="0" y="0"/>
-          <a:ext cx="0" cy="0"/>
-          <a:chOff x="0" y="0"/>
-          <a:chExt cx="0" cy="0"/>
-        </a:xfrm>
-      </p:grpSpPr>
-      <p:sp>
-        <p:nvSpPr>
-          <p:cNvPr id="2" name="Content Placeholder 1"/>
-          <p:cNvSpPr>
-            <a:spLocks noGrp="1"/>
-          </p:cNvSpPr>
-          <p:nvPr>
-            <p:ph idx="1"/>
-          </p:nvPr>
-        </p:nvSpPr>
-        <p:spPr/>
-        <p:txBody>
-          <a:bodyPr/>
-          <a:lstStyle/>
-          <a:p>
-            <a:r>
-              <a:rPr lang="en-GB" dirty="0" smtClean="0"/>
-              <a:t>Distributed computing models</a:t>
-            </a:r>
-          </a:p>
-          <a:p>
-            <a:r>
-              <a:rPr lang="en-GB" dirty="0" smtClean="0"/>
-              <a:t>Learning to Rank algorithms</a:t>
-            </a:r>
-          </a:p>
-          <a:p>
-            <a:r>
-              <a:rPr lang="en-GB" dirty="0" smtClean="0"/>
-              <a:t>Optimisation algorithms</a:t>
-            </a:r>
-            <a:endParaRPr lang="en-GB" dirty="0"/>
-          </a:p>
-        </p:txBody>
-      </p:sp>
-      <p:sp>
-        <p:nvSpPr>
-          <p:cNvPr id="3" name="Text Placeholder 2"/>
-          <p:cNvSpPr>
-            <a:spLocks noGrp="1"/>
-          </p:cNvSpPr>
-          <p:nvPr>
-            <p:ph type="body" sz="quarter" idx="13"/>
-          </p:nvPr>
-        </p:nvSpPr>
-        <p:spPr/>
-        <p:txBody>
-          <a:bodyPr/>
-          <a:lstStyle/>
-          <a:p>
-            <a:r>
-              <a:rPr lang="en-GB" dirty="0" smtClean="0"/>
-              <a:t>Future work</a:t>
-            </a:r>
-            <a:endParaRPr lang="en-GB" dirty="0"/>
-          </a:p>
-        </p:txBody>
-      </p:sp>
-      <p:sp>
-        <p:nvSpPr>
-          <p:cNvPr id="4" name="Text Placeholder 3"/>
-          <p:cNvSpPr>
-            <a:spLocks noGrp="1"/>
-          </p:cNvSpPr>
-          <p:nvPr>
-            <p:ph type="body" sz="quarter" idx="14"/>
-          </p:nvPr>
-        </p:nvSpPr>
-        <p:spPr/>
-        <p:txBody>
-          <a:bodyPr/>
-          <a:lstStyle/>
-          <a:p>
-            <a:endParaRPr lang="en-GB"/>
-          </a:p>
-        </p:txBody>
-      </p:sp>
-    </p:spTree>
-    <p:extLst>
-      <p:ext uri="{BB962C8B-B14F-4D97-AF65-F5344CB8AC3E}">
-        <p14:creationId xmlns:p14="http://schemas.microsoft.com/office/powerpoint/2010/main" val="4159291697"/>
-      </p:ext>
-    </p:extLst>
-  </p:cSld>
-  <p:clrMapOvr>
-    <a:masterClrMapping/>
-  </p:clrMapOvr>
-  <p:timing>
-    <p:tnLst>
-      <p:par>
-        <p:cTn id="1" dur="indefinite" restart="never" nodeType="tmRoot"/>
-      </p:par>
-    </p:tnLst>
-  </p:timing>
-</p:sld>
-</file>
-
-<file path=ppt/slides/slide3.xml><?xml version="1.0" encoding="utf-8"?>
+<file path=ppt/slides/slide6.xml><?xml version="1.0" encoding="utf-8"?>
 <p:sld xmlns:a="http://schemas.openxmlformats.org/drawingml/2006/main" xmlns:r="http://schemas.openxmlformats.org/officeDocument/2006/relationships" xmlns:p="http://schemas.openxmlformats.org/presentationml/2006/main">
   <p:cSld>
     <p:spTree>
@@ -8013,7 +8575,7 @@
 </p:sld>
 </file>
 
-<file path=ppt/slides/slide4.xml><?xml version="1.0" encoding="utf-8"?>
+<file path=ppt/slides/slide7.xml><?xml version="1.0" encoding="utf-8"?>
 <p:sld xmlns:a="http://schemas.openxmlformats.org/drawingml/2006/main" xmlns:r="http://schemas.openxmlformats.org/officeDocument/2006/relationships" xmlns:p="http://schemas.openxmlformats.org/presentationml/2006/main">
   <p:cSld>
     <p:spTree>
@@ -8079,7 +8641,7 @@
 </p:sld>
 </file>
 
-<file path=ppt/slides/slide5.xml><?xml version="1.0" encoding="utf-8"?>
+<file path=ppt/slides/slide8.xml><?xml version="1.0" encoding="utf-8"?>
 <p:sld xmlns:a="http://schemas.openxmlformats.org/drawingml/2006/main" xmlns:r="http://schemas.openxmlformats.org/officeDocument/2006/relationships" xmlns:p="http://schemas.openxmlformats.org/presentationml/2006/main">
   <p:cSld>
     <p:spTree>
@@ -8145,7 +8707,7 @@
 </p:sld>
 </file>
 
-<file path=ppt/slides/slide6.xml><?xml version="1.0" encoding="utf-8"?>
+<file path=ppt/slides/slide9.xml><?xml version="1.0" encoding="utf-8"?>
 <p:sld xmlns:a="http://schemas.openxmlformats.org/drawingml/2006/main" xmlns:r="http://schemas.openxmlformats.org/officeDocument/2006/relationships" xmlns:p="http://schemas.openxmlformats.org/presentationml/2006/main">
   <p:cSld>
     <p:spTree>
@@ -8195,350 +8757,6 @@
     <p:extLst>
       <p:ext uri="{BB962C8B-B14F-4D97-AF65-F5344CB8AC3E}">
         <p14:creationId xmlns:p14="http://schemas.microsoft.com/office/powerpoint/2010/main" val="1942269634"/>
-      </p:ext>
-    </p:extLst>
-  </p:cSld>
-  <p:clrMapOvr>
-    <a:masterClrMapping/>
-  </p:clrMapOvr>
-  <p:timing>
-    <p:tnLst>
-      <p:par>
-        <p:cTn id="1" dur="indefinite" restart="never" nodeType="tmRoot"/>
-      </p:par>
-    </p:tnLst>
-  </p:timing>
-</p:sld>
-</file>
-
-<file path=ppt/slides/slide7.xml><?xml version="1.0" encoding="utf-8"?>
-<p:sld xmlns:a="http://schemas.openxmlformats.org/drawingml/2006/main" xmlns:r="http://schemas.openxmlformats.org/officeDocument/2006/relationships" xmlns:p="http://schemas.openxmlformats.org/presentationml/2006/main">
-  <p:cSld>
-    <p:spTree>
-      <p:nvGrpSpPr>
-        <p:cNvPr id="1" name=""/>
-        <p:cNvGrpSpPr/>
-        <p:nvPr/>
-      </p:nvGrpSpPr>
-      <p:grpSpPr>
-        <a:xfrm>
-          <a:off x="0" y="0"/>
-          <a:ext cx="0" cy="0"/>
-          <a:chOff x="0" y="0"/>
-          <a:chExt cx="0" cy="0"/>
-        </a:xfrm>
-      </p:grpSpPr>
-      <p:pic>
-        <p:nvPicPr>
-          <p:cNvPr id="8" name="Content Placeholder 7"/>
-          <p:cNvPicPr>
-            <a:picLocks noGrp="1" noChangeAspect="1"/>
-          </p:cNvPicPr>
-          <p:nvPr>
-            <p:ph idx="1"/>
-          </p:nvPr>
-        </p:nvPicPr>
-        <p:blipFill>
-          <a:blip r:embed="rId3">
-            <a:extLst>
-              <a:ext uri="{28A0092B-C50C-407E-A947-70E740481C1C}">
-                <a14:useLocalDpi xmlns:a14="http://schemas.microsoft.com/office/drawing/2010/main" val="0"/>
-              </a:ext>
-            </a:extLst>
-          </a:blip>
-          <a:stretch>
-            <a:fillRect/>
-          </a:stretch>
-        </p:blipFill>
-        <p:spPr>
-          <a:xfrm>
-            <a:off x="4" y="-13063"/>
-            <a:ext cx="13487392" cy="6884190"/>
-          </a:xfrm>
-        </p:spPr>
-      </p:pic>
-    </p:spTree>
-    <p:extLst>
-      <p:ext uri="{BB962C8B-B14F-4D97-AF65-F5344CB8AC3E}">
-        <p14:creationId xmlns:p14="http://schemas.microsoft.com/office/powerpoint/2010/main" val="3012314909"/>
-      </p:ext>
-    </p:extLst>
-  </p:cSld>
-  <p:clrMapOvr>
-    <a:masterClrMapping/>
-  </p:clrMapOvr>
-  <p:timing>
-    <p:tnLst>
-      <p:par>
-        <p:cTn id="1" dur="indefinite" restart="never" nodeType="tmRoot"/>
-      </p:par>
-    </p:tnLst>
-  </p:timing>
-</p:sld>
-</file>
-
-<file path=ppt/slides/slide8.xml><?xml version="1.0" encoding="utf-8"?>
-<p:sld xmlns:a="http://schemas.openxmlformats.org/drawingml/2006/main" xmlns:r="http://schemas.openxmlformats.org/officeDocument/2006/relationships" xmlns:p="http://schemas.openxmlformats.org/presentationml/2006/main">
-  <p:cSld>
-    <p:spTree>
-      <p:nvGrpSpPr>
-        <p:cNvPr id="1" name=""/>
-        <p:cNvGrpSpPr/>
-        <p:nvPr/>
-      </p:nvGrpSpPr>
-      <p:grpSpPr>
-        <a:xfrm>
-          <a:off x="0" y="0"/>
-          <a:ext cx="0" cy="0"/>
-          <a:chOff x="0" y="0"/>
-          <a:chExt cx="0" cy="0"/>
-        </a:xfrm>
-      </p:grpSpPr>
-      <p:pic>
-        <p:nvPicPr>
-          <p:cNvPr id="8" name="Content Placeholder 7"/>
-          <p:cNvPicPr>
-            <a:picLocks noGrp="1" noChangeAspect="1"/>
-          </p:cNvPicPr>
-          <p:nvPr>
-            <p:ph idx="1"/>
-          </p:nvPr>
-        </p:nvPicPr>
-        <p:blipFill>
-          <a:blip r:embed="rId3">
-            <a:extLst>
-              <a:ext uri="{28A0092B-C50C-407E-A947-70E740481C1C}">
-                <a14:useLocalDpi xmlns:a14="http://schemas.microsoft.com/office/drawing/2010/main" val="0"/>
-              </a:ext>
-            </a:extLst>
-          </a:blip>
-          <a:stretch>
-            <a:fillRect/>
-          </a:stretch>
-        </p:blipFill>
-        <p:spPr>
-          <a:xfrm>
-            <a:off x="4" y="-13063"/>
-            <a:ext cx="13487392" cy="6884189"/>
-          </a:xfrm>
-        </p:spPr>
-      </p:pic>
-    </p:spTree>
-    <p:extLst>
-      <p:ext uri="{BB962C8B-B14F-4D97-AF65-F5344CB8AC3E}">
-        <p14:creationId xmlns:p14="http://schemas.microsoft.com/office/powerpoint/2010/main" val="3837428961"/>
-      </p:ext>
-    </p:extLst>
-  </p:cSld>
-  <p:clrMapOvr>
-    <a:masterClrMapping/>
-  </p:clrMapOvr>
-  <p:timing>
-    <p:tnLst>
-      <p:par>
-        <p:cTn id="1" dur="indefinite" restart="never" nodeType="tmRoot"/>
-      </p:par>
-    </p:tnLst>
-  </p:timing>
-</p:sld>
-</file>
-
-<file path=ppt/slides/slide9.xml><?xml version="1.0" encoding="utf-8"?>
-<p:sld xmlns:a="http://schemas.openxmlformats.org/drawingml/2006/main" xmlns:r="http://schemas.openxmlformats.org/officeDocument/2006/relationships" xmlns:p="http://schemas.openxmlformats.org/presentationml/2006/main">
-  <p:cSld>
-    <p:bg>
-      <p:bgPr>
-        <a:solidFill>
-          <a:schemeClr val="bg1"/>
-        </a:solidFill>
-        <a:effectLst/>
-      </p:bgPr>
-    </p:bg>
-    <p:spTree>
-      <p:nvGrpSpPr>
-        <p:cNvPr id="1" name=""/>
-        <p:cNvGrpSpPr/>
-        <p:nvPr/>
-      </p:nvGrpSpPr>
-      <p:grpSpPr>
-        <a:xfrm>
-          <a:off x="0" y="0"/>
-          <a:ext cx="0" cy="0"/>
-          <a:chOff x="0" y="0"/>
-          <a:chExt cx="0" cy="0"/>
-        </a:xfrm>
-      </p:grpSpPr>
-      <p:sp>
-        <p:nvSpPr>
-          <p:cNvPr id="2" name="Content Placeholder 1"/>
-          <p:cNvSpPr>
-            <a:spLocks noGrp="1"/>
-          </p:cNvSpPr>
-          <p:nvPr>
-            <p:ph idx="1"/>
-          </p:nvPr>
-        </p:nvSpPr>
-        <p:spPr/>
-        <p:txBody>
-          <a:bodyPr/>
-          <a:lstStyle/>
-          <a:p>
-            <a:r>
-              <a:rPr lang="en-GB" dirty="0" smtClean="0"/>
-              <a:t>Highly relevant documents are more useful when appearing higher in a search engine result list</a:t>
-            </a:r>
-          </a:p>
-          <a:p>
-            <a:r>
-              <a:rPr lang="en-GB" dirty="0" smtClean="0"/>
-              <a:t>Highly relevant documents are more useful than marginally relevant documents</a:t>
-            </a:r>
-          </a:p>
-          <a:p>
-            <a:endParaRPr lang="en-GB" dirty="0"/>
-          </a:p>
-        </p:txBody>
-      </p:sp>
-      <p:sp>
-        <p:nvSpPr>
-          <p:cNvPr id="3" name="Text Placeholder 2"/>
-          <p:cNvSpPr>
-            <a:spLocks noGrp="1"/>
-          </p:cNvSpPr>
-          <p:nvPr>
-            <p:ph type="body" sz="quarter" idx="13"/>
-          </p:nvPr>
-        </p:nvSpPr>
-        <p:spPr/>
-        <p:txBody>
-          <a:bodyPr/>
-          <a:lstStyle/>
-          <a:p>
-            <a:r>
-              <a:rPr lang="en-GB" dirty="0" smtClean="0"/>
-              <a:t>So… what makes a good ranking?</a:t>
-            </a:r>
-            <a:endParaRPr lang="en-GB" dirty="0"/>
-          </a:p>
-        </p:txBody>
-      </p:sp>
-      <p:sp>
-        <p:nvSpPr>
-          <p:cNvPr id="4" name="Text Placeholder 3"/>
-          <p:cNvSpPr>
-            <a:spLocks noGrp="1"/>
-          </p:cNvSpPr>
-          <p:nvPr>
-            <p:ph type="body" sz="quarter" idx="14"/>
-          </p:nvPr>
-        </p:nvSpPr>
-        <p:spPr/>
-        <p:txBody>
-          <a:bodyPr/>
-          <a:lstStyle/>
-          <a:p>
-            <a:r>
-              <a:rPr lang="en-GB" dirty="0" smtClean="0"/>
-              <a:t>Normalized Discounted Cumulative Gain</a:t>
-            </a:r>
-            <a:endParaRPr lang="en-GB" dirty="0"/>
-          </a:p>
-        </p:txBody>
-      </p:sp>
-      <p:pic>
-        <p:nvPicPr>
-          <p:cNvPr id="5" name="Picture 4"/>
-          <p:cNvPicPr>
-            <a:picLocks noChangeAspect="1"/>
-          </p:cNvPicPr>
-          <p:nvPr/>
-        </p:nvPicPr>
-        <p:blipFill>
-          <a:blip r:embed="rId2">
-            <a:extLst>
-              <a:ext uri="{28A0092B-C50C-407E-A947-70E740481C1C}">
-                <a14:useLocalDpi xmlns:a14="http://schemas.microsoft.com/office/drawing/2010/main" val="0"/>
-              </a:ext>
-            </a:extLst>
-          </a:blip>
-          <a:stretch>
-            <a:fillRect/>
-          </a:stretch>
-        </p:blipFill>
-        <p:spPr>
-          <a:xfrm>
-            <a:off x="1276156" y="3526588"/>
-            <a:ext cx="1390844" cy="609685"/>
-          </a:xfrm>
-          <a:prstGeom prst="rect">
-            <a:avLst/>
-          </a:prstGeom>
-        </p:spPr>
-      </p:pic>
-      <p:pic>
-        <p:nvPicPr>
-          <p:cNvPr id="6" name="Picture 5"/>
-          <p:cNvPicPr>
-            <a:picLocks noChangeAspect="1"/>
-          </p:cNvPicPr>
-          <p:nvPr/>
-        </p:nvPicPr>
-        <p:blipFill>
-          <a:blip r:embed="rId3">
-            <a:extLst>
-              <a:ext uri="{28A0092B-C50C-407E-A947-70E740481C1C}">
-                <a14:useLocalDpi xmlns:a14="http://schemas.microsoft.com/office/drawing/2010/main" val="0"/>
-              </a:ext>
-            </a:extLst>
-          </a:blip>
-          <a:stretch>
-            <a:fillRect/>
-          </a:stretch>
-        </p:blipFill>
-        <p:spPr>
-          <a:xfrm>
-            <a:off x="1276156" y="4344611"/>
-            <a:ext cx="2019582" cy="609685"/>
-          </a:xfrm>
-          <a:prstGeom prst="rect">
-            <a:avLst/>
-          </a:prstGeom>
-        </p:spPr>
-      </p:pic>
-      <p:pic>
-        <p:nvPicPr>
-          <p:cNvPr id="7" name="Picture 6"/>
-          <p:cNvPicPr>
-            <a:picLocks noChangeAspect="1"/>
-          </p:cNvPicPr>
-          <p:nvPr/>
-        </p:nvPicPr>
-        <p:blipFill>
-          <a:blip r:embed="rId4">
-            <a:extLst>
-              <a:ext uri="{28A0092B-C50C-407E-A947-70E740481C1C}">
-                <a14:useLocalDpi xmlns:a14="http://schemas.microsoft.com/office/drawing/2010/main" val="0"/>
-              </a:ext>
-            </a:extLst>
-          </a:blip>
-          <a:stretch>
-            <a:fillRect/>
-          </a:stretch>
-        </p:blipFill>
-        <p:spPr>
-          <a:xfrm>
-            <a:off x="1276156" y="5286677"/>
-            <a:ext cx="1638529" cy="533474"/>
-          </a:xfrm>
-          <a:prstGeom prst="rect">
-            <a:avLst/>
-          </a:prstGeom>
-        </p:spPr>
-      </p:pic>
-    </p:spTree>
-    <p:extLst>
-      <p:ext uri="{BB962C8B-B14F-4D97-AF65-F5344CB8AC3E}">
-        <p14:creationId xmlns:p14="http://schemas.microsoft.com/office/powerpoint/2010/main" val="1086106109"/>
       </p:ext>
     </p:extLst>
   </p:cSld>

</xml_diff>

<commit_message>
mooie dingen, nu bier'
</commit_message>
<xml_diff>
--- a/presentation/Scaling Learning to Rank to Big data.pptx
+++ b/presentation/Scaling Learning to Rank to Big data.pptx
@@ -5,7 +5,7 @@
     <p:sldMasterId id="2147483648" r:id="rId1"/>
   </p:sldMasterIdLst>
   <p:notesMasterIdLst>
-    <p:notesMasterId r:id="rId31"/>
+    <p:notesMasterId r:id="rId29"/>
   </p:notesMasterIdLst>
   <p:sldIdLst>
     <p:sldId id="256" r:id="rId2"/>
@@ -22,21 +22,19 @@
     <p:sldId id="263" r:id="rId13"/>
     <p:sldId id="264" r:id="rId14"/>
     <p:sldId id="265" r:id="rId15"/>
-    <p:sldId id="266" r:id="rId16"/>
-    <p:sldId id="268" r:id="rId17"/>
-    <p:sldId id="269" r:id="rId18"/>
-    <p:sldId id="270" r:id="rId19"/>
-    <p:sldId id="271" r:id="rId20"/>
-    <p:sldId id="272" r:id="rId21"/>
-    <p:sldId id="273" r:id="rId22"/>
-    <p:sldId id="274" r:id="rId23"/>
-    <p:sldId id="275" r:id="rId24"/>
-    <p:sldId id="282" r:id="rId25"/>
-    <p:sldId id="283" r:id="rId26"/>
-    <p:sldId id="284" r:id="rId27"/>
-    <p:sldId id="285" r:id="rId28"/>
-    <p:sldId id="286" r:id="rId29"/>
-    <p:sldId id="287" r:id="rId30"/>
+    <p:sldId id="268" r:id="rId16"/>
+    <p:sldId id="270" r:id="rId17"/>
+    <p:sldId id="271" r:id="rId18"/>
+    <p:sldId id="272" r:id="rId19"/>
+    <p:sldId id="273" r:id="rId20"/>
+    <p:sldId id="274" r:id="rId21"/>
+    <p:sldId id="275" r:id="rId22"/>
+    <p:sldId id="282" r:id="rId23"/>
+    <p:sldId id="283" r:id="rId24"/>
+    <p:sldId id="284" r:id="rId25"/>
+    <p:sldId id="285" r:id="rId26"/>
+    <p:sldId id="286" r:id="rId27"/>
+    <p:sldId id="287" r:id="rId28"/>
   </p:sldIdLst>
   <p:sldSz cx="9144000" cy="6858000" type="screen4x3"/>
   <p:notesSz cx="6858000" cy="9144000"/>
@@ -1366,7 +1364,7 @@
             <a:fld id="{7DE1BD2A-F24E-4ECA-82B3-08C5D5A627D6}" type="slidenum">
               <a:rPr lang="nl-NL" smtClean="0"/>
               <a:pPr/>
-              <a:t>19</a:t>
+              <a:t>17</a:t>
             </a:fld>
             <a:endParaRPr lang="nl-NL" dirty="0"/>
           </a:p>
@@ -5710,15 +5708,7 @@
           <a:p>
             <a:r>
               <a:rPr lang="en-GB" dirty="0" smtClean="0"/>
-              <a:t>Highly </a:t>
-            </a:r>
-            <a:r>
-              <a:rPr lang="en-GB" dirty="0" smtClean="0"/>
-              <a:t>relevant documents are more useful than marginally relevant </a:t>
-            </a:r>
-            <a:r>
-              <a:rPr lang="en-GB" dirty="0" smtClean="0"/>
-              <a:t>documents</a:t>
+              <a:t>Highly relevant documents are more useful than marginally relevant documents</a:t>
             </a:r>
           </a:p>
           <a:p>
@@ -6039,15 +6029,72 @@
           <a:lstStyle/>
           <a:p>
             <a:r>
+              <a:rPr lang="en-US" b="1" dirty="0" smtClean="0"/>
+              <a:t>RQ1</a:t>
+            </a:r>
+            <a:r>
+              <a:rPr lang="en-US" dirty="0" smtClean="0"/>
+              <a:t> </a:t>
+            </a:r>
+            <a:r>
+              <a:rPr lang="en-US" dirty="0"/>
+              <a:t>What are the best performing Learning to Rank algorithms in terms </a:t>
+            </a:r>
+            <a:r>
+              <a:rPr lang="en-US" dirty="0" smtClean="0"/>
+              <a:t>of ranking </a:t>
+            </a:r>
+            <a:r>
+              <a:rPr lang="en-US" dirty="0"/>
+              <a:t>accuracy on relevant benchmark data sets</a:t>
+            </a:r>
+            <a:r>
+              <a:rPr lang="en-US" dirty="0" smtClean="0"/>
+              <a:t>?</a:t>
+            </a:r>
+          </a:p>
+          <a:p>
+            <a:endParaRPr lang="en-US" dirty="0"/>
+          </a:p>
+          <a:p>
+            <a:r>
+              <a:rPr lang="en-US" b="1" dirty="0" smtClean="0"/>
+              <a:t>RQ2</a:t>
+            </a:r>
+            <a:r>
+              <a:rPr lang="en-US" dirty="0" smtClean="0"/>
+              <a:t> What </a:t>
+            </a:r>
+            <a:r>
+              <a:rPr lang="en-US" dirty="0"/>
+              <a:t>is the speed-up of those Learning to Rank algorithms when </a:t>
+            </a:r>
+            <a:r>
+              <a:rPr lang="en-US" dirty="0" smtClean="0"/>
+              <a:t>executed </a:t>
+            </a:r>
+            <a:r>
               <a:rPr lang="en-GB" dirty="0" smtClean="0"/>
-              <a:t>There is more to ranking than being accurate</a:t>
-            </a:r>
-          </a:p>
-          <a:p>
-            <a:r>
-              <a:rPr lang="en-GB" dirty="0" smtClean="0"/>
-              <a:t>Scalability</a:t>
-            </a:r>
+              <a:t>using </a:t>
+            </a:r>
+            <a:r>
+              <a:rPr lang="en-GB" dirty="0"/>
+              <a:t>the </a:t>
+            </a:r>
+            <a:r>
+              <a:rPr lang="en-GB" dirty="0" err="1"/>
+              <a:t>MapReduce</a:t>
+            </a:r>
+            <a:r>
+              <a:rPr lang="en-GB" dirty="0"/>
+              <a:t> framework?</a:t>
+            </a:r>
+            <a:endParaRPr lang="en-GB" dirty="0" smtClean="0"/>
+          </a:p>
+          <a:p>
+            <a:pPr marL="0" indent="0">
+              <a:buNone/>
+            </a:pPr>
             <a:endParaRPr lang="en-GB" dirty="0"/>
           </a:p>
         </p:txBody>
@@ -6067,26 +6114,11 @@
           <a:bodyPr/>
           <a:lstStyle/>
           <a:p>
+            <a:r>
+              <a:rPr lang="en-GB" dirty="0" smtClean="0"/>
+              <a:t>Research questions</a:t>
+            </a:r>
             <a:endParaRPr lang="en-GB" dirty="0"/>
-          </a:p>
-        </p:txBody>
-      </p:sp>
-      <p:sp>
-        <p:nvSpPr>
-          <p:cNvPr id="4" name="Text Placeholder 3"/>
-          <p:cNvSpPr>
-            <a:spLocks noGrp="1"/>
-          </p:cNvSpPr>
-          <p:nvPr>
-            <p:ph type="body" sz="quarter" idx="14"/>
-          </p:nvPr>
-        </p:nvSpPr>
-        <p:spPr/>
-        <p:txBody>
-          <a:bodyPr/>
-          <a:lstStyle/>
-          <a:p>
-            <a:endParaRPr lang="en-GB"/>
           </a:p>
         </p:txBody>
       </p:sp>
@@ -6111,114 +6143,6 @@
 </file>
 
 <file path=ppt/slides/slide15.xml><?xml version="1.0" encoding="utf-8"?>
-<p:sld xmlns:a="http://schemas.openxmlformats.org/drawingml/2006/main" xmlns:r="http://schemas.openxmlformats.org/officeDocument/2006/relationships" xmlns:p="http://schemas.openxmlformats.org/presentationml/2006/main">
-  <p:cSld>
-    <p:spTree>
-      <p:nvGrpSpPr>
-        <p:cNvPr id="1" name=""/>
-        <p:cNvGrpSpPr/>
-        <p:nvPr/>
-      </p:nvGrpSpPr>
-      <p:grpSpPr>
-        <a:xfrm>
-          <a:off x="0" y="0"/>
-          <a:ext cx="0" cy="0"/>
-          <a:chOff x="0" y="0"/>
-          <a:chExt cx="0" cy="0"/>
-        </a:xfrm>
-      </p:grpSpPr>
-      <p:sp>
-        <p:nvSpPr>
-          <p:cNvPr id="2" name="Content Placeholder 1"/>
-          <p:cNvSpPr>
-            <a:spLocks noGrp="1"/>
-          </p:cNvSpPr>
-          <p:nvPr>
-            <p:ph idx="1"/>
-          </p:nvPr>
-        </p:nvSpPr>
-        <p:spPr/>
-        <p:txBody>
-          <a:bodyPr/>
-          <a:lstStyle/>
-          <a:p>
-            <a:r>
-              <a:rPr lang="en-GB" dirty="0" smtClean="0"/>
-              <a:t>We focus on exploring the scalability of the “most accurate” ranking methods.</a:t>
-            </a:r>
-          </a:p>
-          <a:p>
-            <a:r>
-              <a:rPr lang="en-GB" dirty="0" smtClean="0"/>
-              <a:t>But which are those “most accurate” ranking methods?</a:t>
-            </a:r>
-            <a:endParaRPr lang="en-GB" dirty="0"/>
-          </a:p>
-        </p:txBody>
-      </p:sp>
-      <p:sp>
-        <p:nvSpPr>
-          <p:cNvPr id="3" name="Text Placeholder 2"/>
-          <p:cNvSpPr>
-            <a:spLocks noGrp="1"/>
-          </p:cNvSpPr>
-          <p:nvPr>
-            <p:ph type="body" sz="quarter" idx="13"/>
-          </p:nvPr>
-        </p:nvSpPr>
-        <p:spPr/>
-        <p:txBody>
-          <a:bodyPr/>
-          <a:lstStyle/>
-          <a:p>
-            <a:r>
-              <a:rPr lang="en-GB" dirty="0" smtClean="0"/>
-              <a:t>Research Scope</a:t>
-            </a:r>
-            <a:endParaRPr lang="en-GB" dirty="0"/>
-          </a:p>
-        </p:txBody>
-      </p:sp>
-      <p:sp>
-        <p:nvSpPr>
-          <p:cNvPr id="4" name="Text Placeholder 3"/>
-          <p:cNvSpPr>
-            <a:spLocks noGrp="1"/>
-          </p:cNvSpPr>
-          <p:nvPr>
-            <p:ph type="body" sz="quarter" idx="14"/>
-          </p:nvPr>
-        </p:nvSpPr>
-        <p:spPr/>
-        <p:txBody>
-          <a:bodyPr/>
-          <a:lstStyle/>
-          <a:p>
-            <a:endParaRPr lang="en-GB"/>
-          </a:p>
-        </p:txBody>
-      </p:sp>
-    </p:spTree>
-    <p:extLst>
-      <p:ext uri="{BB962C8B-B14F-4D97-AF65-F5344CB8AC3E}">
-        <p14:creationId xmlns:p14="http://schemas.microsoft.com/office/powerpoint/2010/main" val="293935111"/>
-      </p:ext>
-    </p:extLst>
-  </p:cSld>
-  <p:clrMapOvr>
-    <a:masterClrMapping/>
-  </p:clrMapOvr>
-  <p:timing>
-    <p:tnLst>
-      <p:par>
-        <p:cTn id="1" dur="indefinite" restart="never" nodeType="tmRoot"/>
-      </p:par>
-    </p:tnLst>
-  </p:timing>
-</p:sld>
-</file>
-
-<file path=ppt/slides/slide16.xml><?xml version="1.0" encoding="utf-8"?>
 <p:sld xmlns:a="http://schemas.openxmlformats.org/drawingml/2006/main" xmlns:r="http://schemas.openxmlformats.org/officeDocument/2006/relationships" xmlns:p="http://schemas.openxmlformats.org/presentationml/2006/main">
   <p:cSld>
     <p:spTree>
@@ -6797,115 +6721,7 @@
 </p:sld>
 </file>
 
-<file path=ppt/slides/slide17.xml><?xml version="1.0" encoding="utf-8"?>
-<p:sld xmlns:a="http://schemas.openxmlformats.org/drawingml/2006/main" xmlns:r="http://schemas.openxmlformats.org/officeDocument/2006/relationships" xmlns:p="http://schemas.openxmlformats.org/presentationml/2006/main">
-  <p:cSld>
-    <p:spTree>
-      <p:nvGrpSpPr>
-        <p:cNvPr id="1" name=""/>
-        <p:cNvGrpSpPr/>
-        <p:nvPr/>
-      </p:nvGrpSpPr>
-      <p:grpSpPr>
-        <a:xfrm>
-          <a:off x="0" y="0"/>
-          <a:ext cx="0" cy="0"/>
-          <a:chOff x="0" y="0"/>
-          <a:chExt cx="0" cy="0"/>
-        </a:xfrm>
-      </p:grpSpPr>
-      <p:sp>
-        <p:nvSpPr>
-          <p:cNvPr id="2" name="Content Placeholder 1"/>
-          <p:cNvSpPr>
-            <a:spLocks noGrp="1"/>
-          </p:cNvSpPr>
-          <p:nvPr>
-            <p:ph idx="1"/>
-          </p:nvPr>
-        </p:nvSpPr>
-        <p:spPr/>
-        <p:txBody>
-          <a:bodyPr/>
-          <a:lstStyle/>
-          <a:p>
-            <a:r>
-              <a:rPr lang="en-GB" dirty="0" smtClean="0"/>
-              <a:t>Forward reference search</a:t>
-            </a:r>
-          </a:p>
-          <a:p>
-            <a:r>
-              <a:rPr lang="en-GB" dirty="0" smtClean="0"/>
-              <a:t>Google scholar search</a:t>
-            </a:r>
-            <a:endParaRPr lang="en-GB" dirty="0"/>
-          </a:p>
-        </p:txBody>
-      </p:sp>
-      <p:sp>
-        <p:nvSpPr>
-          <p:cNvPr id="3" name="Text Placeholder 2"/>
-          <p:cNvSpPr>
-            <a:spLocks noGrp="1"/>
-          </p:cNvSpPr>
-          <p:nvPr>
-            <p:ph type="body" sz="quarter" idx="13"/>
-          </p:nvPr>
-        </p:nvSpPr>
-        <p:spPr/>
-        <p:txBody>
-          <a:bodyPr/>
-          <a:lstStyle/>
-          <a:p>
-            <a:r>
-              <a:rPr lang="en-GB" dirty="0" smtClean="0"/>
-              <a:t>Search methodology</a:t>
-            </a:r>
-            <a:endParaRPr lang="en-GB" dirty="0"/>
-          </a:p>
-        </p:txBody>
-      </p:sp>
-      <p:sp>
-        <p:nvSpPr>
-          <p:cNvPr id="4" name="Text Placeholder 3"/>
-          <p:cNvSpPr>
-            <a:spLocks noGrp="1"/>
-          </p:cNvSpPr>
-          <p:nvPr>
-            <p:ph type="body" sz="quarter" idx="14"/>
-          </p:nvPr>
-        </p:nvSpPr>
-        <p:spPr/>
-        <p:txBody>
-          <a:bodyPr/>
-          <a:lstStyle/>
-          <a:p>
-            <a:endParaRPr lang="en-GB"/>
-          </a:p>
-        </p:txBody>
-      </p:sp>
-    </p:spTree>
-    <p:extLst>
-      <p:ext uri="{BB962C8B-B14F-4D97-AF65-F5344CB8AC3E}">
-        <p14:creationId xmlns:p14="http://schemas.microsoft.com/office/powerpoint/2010/main" val="540176694"/>
-      </p:ext>
-    </p:extLst>
-  </p:cSld>
-  <p:clrMapOvr>
-    <a:masterClrMapping/>
-  </p:clrMapOvr>
-  <p:timing>
-    <p:tnLst>
-      <p:par>
-        <p:cTn id="1" dur="indefinite" restart="never" nodeType="tmRoot"/>
-      </p:par>
-    </p:tnLst>
-  </p:timing>
-</p:sld>
-</file>
-
-<file path=ppt/slides/slide18.xml><?xml version="1.0" encoding="utf-8"?>
+<file path=ppt/slides/slide16.xml><?xml version="1.0" encoding="utf-8"?>
 <p:sld xmlns:a="http://schemas.openxmlformats.org/drawingml/2006/main" xmlns:r="http://schemas.openxmlformats.org/officeDocument/2006/relationships" xmlns:p="http://schemas.openxmlformats.org/presentationml/2006/main">
   <p:cSld>
     <p:spTree>
@@ -7043,7 +6859,7 @@
 </p:sld>
 </file>
 
-<file path=ppt/slides/slide19.xml><?xml version="1.0" encoding="utf-8"?>
+<file path=ppt/slides/slide17.xml><?xml version="1.0" encoding="utf-8"?>
 <p:sld xmlns:a="http://schemas.openxmlformats.org/drawingml/2006/main" xmlns:r="http://schemas.openxmlformats.org/officeDocument/2006/relationships" xmlns:p="http://schemas.openxmlformats.org/presentationml/2006/main">
   <p:cSld>
     <p:spTree>
@@ -7093,6 +6909,269 @@
     <p:extLst>
       <p:ext uri="{BB962C8B-B14F-4D97-AF65-F5344CB8AC3E}">
         <p14:creationId xmlns:p14="http://schemas.microsoft.com/office/powerpoint/2010/main" val="3275392949"/>
+      </p:ext>
+    </p:extLst>
+  </p:cSld>
+  <p:clrMapOvr>
+    <a:masterClrMapping/>
+  </p:clrMapOvr>
+  <p:timing>
+    <p:tnLst>
+      <p:par>
+        <p:cTn id="1" dur="indefinite" restart="never" nodeType="tmRoot"/>
+      </p:par>
+    </p:tnLst>
+  </p:timing>
+</p:sld>
+</file>
+
+<file path=ppt/slides/slide18.xml><?xml version="1.0" encoding="utf-8"?>
+<p:sld xmlns:a="http://schemas.openxmlformats.org/drawingml/2006/main" xmlns:r="http://schemas.openxmlformats.org/officeDocument/2006/relationships" xmlns:p="http://schemas.openxmlformats.org/presentationml/2006/main">
+  <p:cSld>
+    <p:spTree>
+      <p:nvGrpSpPr>
+        <p:cNvPr id="1" name=""/>
+        <p:cNvGrpSpPr/>
+        <p:nvPr/>
+      </p:nvGrpSpPr>
+      <p:grpSpPr>
+        <a:xfrm>
+          <a:off x="0" y="0"/>
+          <a:ext cx="0" cy="0"/>
+          <a:chOff x="0" y="0"/>
+          <a:chExt cx="0" cy="0"/>
+        </a:xfrm>
+      </p:grpSpPr>
+      <p:sp>
+        <p:nvSpPr>
+          <p:cNvPr id="2" name="Content Placeholder 1"/>
+          <p:cNvSpPr>
+            <a:spLocks noGrp="1"/>
+          </p:cNvSpPr>
+          <p:nvPr>
+            <p:ph idx="1"/>
+          </p:nvPr>
+        </p:nvSpPr>
+        <p:spPr/>
+        <p:txBody>
+          <a:bodyPr/>
+          <a:lstStyle/>
+          <a:p>
+            <a:r>
+              <a:rPr lang="en-GB" dirty="0" smtClean="0"/>
+              <a:t>Winning Number (Liu et al., 2007)</a:t>
+            </a:r>
+          </a:p>
+          <a:p>
+            <a:endParaRPr lang="en-GB" dirty="0"/>
+          </a:p>
+          <a:p>
+            <a:r>
+              <a:rPr lang="en-GB" dirty="0" smtClean="0"/>
+              <a:t>Winning Number adapted for sparse evaluation sets:</a:t>
+            </a:r>
+          </a:p>
+          <a:p>
+            <a:pPr lvl="1"/>
+            <a:r>
+              <a:rPr lang="en-GB" dirty="0" smtClean="0"/>
+              <a:t>Ideal Winning Number </a:t>
+            </a:r>
+          </a:p>
+          <a:p>
+            <a:pPr lvl="1"/>
+            <a:r>
+              <a:rPr lang="en-GB" dirty="0" smtClean="0"/>
+              <a:t>Normalized Winning Number</a:t>
+            </a:r>
+            <a:endParaRPr lang="en-GB" dirty="0"/>
+          </a:p>
+        </p:txBody>
+      </p:sp>
+      <p:sp>
+        <p:nvSpPr>
+          <p:cNvPr id="3" name="Text Placeholder 2"/>
+          <p:cNvSpPr>
+            <a:spLocks noGrp="1"/>
+          </p:cNvSpPr>
+          <p:nvPr>
+            <p:ph type="body" sz="quarter" idx="13"/>
+          </p:nvPr>
+        </p:nvSpPr>
+        <p:spPr/>
+        <p:txBody>
+          <a:bodyPr/>
+          <a:lstStyle/>
+          <a:p>
+            <a:r>
+              <a:rPr lang="en-GB" dirty="0" smtClean="0"/>
+              <a:t>Comparison methodology</a:t>
+            </a:r>
+            <a:endParaRPr lang="en-GB" dirty="0"/>
+          </a:p>
+        </p:txBody>
+      </p:sp>
+      <p:sp>
+        <p:nvSpPr>
+          <p:cNvPr id="4" name="Text Placeholder 3"/>
+          <p:cNvSpPr>
+            <a:spLocks noGrp="1"/>
+          </p:cNvSpPr>
+          <p:nvPr>
+            <p:ph type="body" sz="quarter" idx="14"/>
+          </p:nvPr>
+        </p:nvSpPr>
+        <p:spPr/>
+        <p:txBody>
+          <a:bodyPr/>
+          <a:lstStyle/>
+          <a:p>
+            <a:endParaRPr lang="en-GB"/>
+          </a:p>
+        </p:txBody>
+      </p:sp>
+      <p:pic>
+        <p:nvPicPr>
+          <p:cNvPr id="5" name="Picture 4"/>
+          <p:cNvPicPr>
+            <a:picLocks noChangeAspect="1"/>
+          </p:cNvPicPr>
+          <p:nvPr/>
+        </p:nvPicPr>
+        <p:blipFill>
+          <a:blip r:embed="rId2" cstate="print">
+            <a:extLst>
+              <a:ext uri="{28A0092B-C50C-407E-A947-70E740481C1C}">
+                <a14:useLocalDpi xmlns:a14="http://schemas.microsoft.com/office/drawing/2010/main" val="0"/>
+              </a:ext>
+            </a:extLst>
+          </a:blip>
+          <a:stretch>
+            <a:fillRect/>
+          </a:stretch>
+        </p:blipFill>
+        <p:spPr>
+          <a:xfrm>
+            <a:off x="4604953" y="5562600"/>
+            <a:ext cx="4386647" cy="698971"/>
+          </a:xfrm>
+          <a:prstGeom prst="rect">
+            <a:avLst/>
+          </a:prstGeom>
+        </p:spPr>
+      </p:pic>
+    </p:spTree>
+    <p:extLst>
+      <p:ext uri="{BB962C8B-B14F-4D97-AF65-F5344CB8AC3E}">
+        <p14:creationId xmlns:p14="http://schemas.microsoft.com/office/powerpoint/2010/main" val="4023418510"/>
+      </p:ext>
+    </p:extLst>
+  </p:cSld>
+  <p:clrMapOvr>
+    <a:masterClrMapping/>
+  </p:clrMapOvr>
+  <p:timing>
+    <p:tnLst>
+      <p:par>
+        <p:cTn id="1" dur="indefinite" restart="never" nodeType="tmRoot"/>
+      </p:par>
+    </p:tnLst>
+  </p:timing>
+</p:sld>
+</file>
+
+<file path=ppt/slides/slide19.xml><?xml version="1.0" encoding="utf-8"?>
+<p:sld xmlns:a="http://schemas.openxmlformats.org/drawingml/2006/main" xmlns:r="http://schemas.openxmlformats.org/officeDocument/2006/relationships" xmlns:p="http://schemas.openxmlformats.org/presentationml/2006/main">
+  <p:cSld>
+    <p:spTree>
+      <p:nvGrpSpPr>
+        <p:cNvPr id="1" name=""/>
+        <p:cNvGrpSpPr/>
+        <p:nvPr/>
+      </p:nvGrpSpPr>
+      <p:grpSpPr>
+        <a:xfrm>
+          <a:off x="0" y="0"/>
+          <a:ext cx="0" cy="0"/>
+          <a:chOff x="0" y="0"/>
+          <a:chExt cx="0" cy="0"/>
+        </a:xfrm>
+      </p:grpSpPr>
+      <p:pic>
+        <p:nvPicPr>
+          <p:cNvPr id="5" name="Content Placeholder 4"/>
+          <p:cNvPicPr>
+            <a:picLocks noGrp="1" noChangeAspect="1"/>
+          </p:cNvPicPr>
+          <p:nvPr>
+            <p:ph idx="1"/>
+          </p:nvPr>
+        </p:nvPicPr>
+        <p:blipFill>
+          <a:blip r:embed="rId2">
+            <a:extLst>
+              <a:ext uri="{28A0092B-C50C-407E-A947-70E740481C1C}">
+                <a14:useLocalDpi xmlns:a14="http://schemas.microsoft.com/office/drawing/2010/main" val="0"/>
+              </a:ext>
+            </a:extLst>
+          </a:blip>
+          <a:stretch>
+            <a:fillRect/>
+          </a:stretch>
+        </p:blipFill>
+        <p:spPr>
+          <a:xfrm>
+            <a:off x="190669" y="1447800"/>
+            <a:ext cx="8953331" cy="3733800"/>
+          </a:xfrm>
+        </p:spPr>
+      </p:pic>
+      <p:sp>
+        <p:nvSpPr>
+          <p:cNvPr id="3" name="Text Placeholder 2"/>
+          <p:cNvSpPr>
+            <a:spLocks noGrp="1"/>
+          </p:cNvSpPr>
+          <p:nvPr>
+            <p:ph type="body" sz="quarter" idx="13"/>
+          </p:nvPr>
+        </p:nvSpPr>
+        <p:spPr/>
+        <p:txBody>
+          <a:bodyPr/>
+          <a:lstStyle/>
+          <a:p>
+            <a:r>
+              <a:rPr lang="en-GB" dirty="0" smtClean="0"/>
+              <a:t>Comparison results</a:t>
+            </a:r>
+            <a:endParaRPr lang="en-GB" dirty="0"/>
+          </a:p>
+        </p:txBody>
+      </p:sp>
+      <p:sp>
+        <p:nvSpPr>
+          <p:cNvPr id="4" name="Text Placeholder 3"/>
+          <p:cNvSpPr>
+            <a:spLocks noGrp="1"/>
+          </p:cNvSpPr>
+          <p:nvPr>
+            <p:ph type="body" sz="quarter" idx="14"/>
+          </p:nvPr>
+        </p:nvSpPr>
+        <p:spPr/>
+        <p:txBody>
+          <a:bodyPr/>
+          <a:lstStyle/>
+          <a:p>
+            <a:endParaRPr lang="en-GB"/>
+          </a:p>
+        </p:txBody>
+      </p:sp>
+    </p:spTree>
+    <p:extLst>
+      <p:ext uri="{BB962C8B-B14F-4D97-AF65-F5344CB8AC3E}">
+        <p14:creationId xmlns:p14="http://schemas.microsoft.com/office/powerpoint/2010/main" val="2813769766"/>
       </p:ext>
     </p:extLst>
   </p:cSld>
@@ -7209,269 +7288,6 @@
           <a:p>
             <a:r>
               <a:rPr lang="en-GB" dirty="0" smtClean="0"/>
-              <a:t>Winning Number (Liu et al., 2007)</a:t>
-            </a:r>
-          </a:p>
-          <a:p>
-            <a:endParaRPr lang="en-GB" dirty="0"/>
-          </a:p>
-          <a:p>
-            <a:r>
-              <a:rPr lang="en-GB" dirty="0" smtClean="0"/>
-              <a:t>Winning Number adapted for sparse evaluation sets:</a:t>
-            </a:r>
-          </a:p>
-          <a:p>
-            <a:pPr lvl="1"/>
-            <a:r>
-              <a:rPr lang="en-GB" dirty="0" smtClean="0"/>
-              <a:t>Ideal Winning Number </a:t>
-            </a:r>
-          </a:p>
-          <a:p>
-            <a:pPr lvl="1"/>
-            <a:r>
-              <a:rPr lang="en-GB" dirty="0" smtClean="0"/>
-              <a:t>Normalized Winning Number</a:t>
-            </a:r>
-            <a:endParaRPr lang="en-GB" dirty="0"/>
-          </a:p>
-        </p:txBody>
-      </p:sp>
-      <p:sp>
-        <p:nvSpPr>
-          <p:cNvPr id="3" name="Text Placeholder 2"/>
-          <p:cNvSpPr>
-            <a:spLocks noGrp="1"/>
-          </p:cNvSpPr>
-          <p:nvPr>
-            <p:ph type="body" sz="quarter" idx="13"/>
-          </p:nvPr>
-        </p:nvSpPr>
-        <p:spPr/>
-        <p:txBody>
-          <a:bodyPr/>
-          <a:lstStyle/>
-          <a:p>
-            <a:r>
-              <a:rPr lang="en-GB" dirty="0" smtClean="0"/>
-              <a:t>Comparison methodology</a:t>
-            </a:r>
-            <a:endParaRPr lang="en-GB" dirty="0"/>
-          </a:p>
-        </p:txBody>
-      </p:sp>
-      <p:sp>
-        <p:nvSpPr>
-          <p:cNvPr id="4" name="Text Placeholder 3"/>
-          <p:cNvSpPr>
-            <a:spLocks noGrp="1"/>
-          </p:cNvSpPr>
-          <p:nvPr>
-            <p:ph type="body" sz="quarter" idx="14"/>
-          </p:nvPr>
-        </p:nvSpPr>
-        <p:spPr/>
-        <p:txBody>
-          <a:bodyPr/>
-          <a:lstStyle/>
-          <a:p>
-            <a:endParaRPr lang="en-GB"/>
-          </a:p>
-        </p:txBody>
-      </p:sp>
-      <p:pic>
-        <p:nvPicPr>
-          <p:cNvPr id="5" name="Picture 4"/>
-          <p:cNvPicPr>
-            <a:picLocks noChangeAspect="1"/>
-          </p:cNvPicPr>
-          <p:nvPr/>
-        </p:nvPicPr>
-        <p:blipFill>
-          <a:blip r:embed="rId2" cstate="print">
-            <a:extLst>
-              <a:ext uri="{28A0092B-C50C-407E-A947-70E740481C1C}">
-                <a14:useLocalDpi xmlns:a14="http://schemas.microsoft.com/office/drawing/2010/main" val="0"/>
-              </a:ext>
-            </a:extLst>
-          </a:blip>
-          <a:stretch>
-            <a:fillRect/>
-          </a:stretch>
-        </p:blipFill>
-        <p:spPr>
-          <a:xfrm>
-            <a:off x="4604953" y="5562600"/>
-            <a:ext cx="4386647" cy="698971"/>
-          </a:xfrm>
-          <a:prstGeom prst="rect">
-            <a:avLst/>
-          </a:prstGeom>
-        </p:spPr>
-      </p:pic>
-    </p:spTree>
-    <p:extLst>
-      <p:ext uri="{BB962C8B-B14F-4D97-AF65-F5344CB8AC3E}">
-        <p14:creationId xmlns:p14="http://schemas.microsoft.com/office/powerpoint/2010/main" val="4023418510"/>
-      </p:ext>
-    </p:extLst>
-  </p:cSld>
-  <p:clrMapOvr>
-    <a:masterClrMapping/>
-  </p:clrMapOvr>
-  <p:timing>
-    <p:tnLst>
-      <p:par>
-        <p:cTn id="1" dur="indefinite" restart="never" nodeType="tmRoot"/>
-      </p:par>
-    </p:tnLst>
-  </p:timing>
-</p:sld>
-</file>
-
-<file path=ppt/slides/slide21.xml><?xml version="1.0" encoding="utf-8"?>
-<p:sld xmlns:a="http://schemas.openxmlformats.org/drawingml/2006/main" xmlns:r="http://schemas.openxmlformats.org/officeDocument/2006/relationships" xmlns:p="http://schemas.openxmlformats.org/presentationml/2006/main">
-  <p:cSld>
-    <p:spTree>
-      <p:nvGrpSpPr>
-        <p:cNvPr id="1" name=""/>
-        <p:cNvGrpSpPr/>
-        <p:nvPr/>
-      </p:nvGrpSpPr>
-      <p:grpSpPr>
-        <a:xfrm>
-          <a:off x="0" y="0"/>
-          <a:ext cx="0" cy="0"/>
-          <a:chOff x="0" y="0"/>
-          <a:chExt cx="0" cy="0"/>
-        </a:xfrm>
-      </p:grpSpPr>
-      <p:pic>
-        <p:nvPicPr>
-          <p:cNvPr id="5" name="Content Placeholder 4"/>
-          <p:cNvPicPr>
-            <a:picLocks noGrp="1" noChangeAspect="1"/>
-          </p:cNvPicPr>
-          <p:nvPr>
-            <p:ph idx="1"/>
-          </p:nvPr>
-        </p:nvPicPr>
-        <p:blipFill>
-          <a:blip r:embed="rId2">
-            <a:extLst>
-              <a:ext uri="{28A0092B-C50C-407E-A947-70E740481C1C}">
-                <a14:useLocalDpi xmlns:a14="http://schemas.microsoft.com/office/drawing/2010/main" val="0"/>
-              </a:ext>
-            </a:extLst>
-          </a:blip>
-          <a:stretch>
-            <a:fillRect/>
-          </a:stretch>
-        </p:blipFill>
-        <p:spPr>
-          <a:xfrm>
-            <a:off x="190669" y="1447800"/>
-            <a:ext cx="8953331" cy="3733800"/>
-          </a:xfrm>
-        </p:spPr>
-      </p:pic>
-      <p:sp>
-        <p:nvSpPr>
-          <p:cNvPr id="3" name="Text Placeholder 2"/>
-          <p:cNvSpPr>
-            <a:spLocks noGrp="1"/>
-          </p:cNvSpPr>
-          <p:nvPr>
-            <p:ph type="body" sz="quarter" idx="13"/>
-          </p:nvPr>
-        </p:nvSpPr>
-        <p:spPr/>
-        <p:txBody>
-          <a:bodyPr/>
-          <a:lstStyle/>
-          <a:p>
-            <a:r>
-              <a:rPr lang="en-GB" dirty="0" smtClean="0"/>
-              <a:t>Comparison results</a:t>
-            </a:r>
-            <a:endParaRPr lang="en-GB" dirty="0"/>
-          </a:p>
-        </p:txBody>
-      </p:sp>
-      <p:sp>
-        <p:nvSpPr>
-          <p:cNvPr id="4" name="Text Placeholder 3"/>
-          <p:cNvSpPr>
-            <a:spLocks noGrp="1"/>
-          </p:cNvSpPr>
-          <p:nvPr>
-            <p:ph type="body" sz="quarter" idx="14"/>
-          </p:nvPr>
-        </p:nvSpPr>
-        <p:spPr/>
-        <p:txBody>
-          <a:bodyPr/>
-          <a:lstStyle/>
-          <a:p>
-            <a:endParaRPr lang="en-GB"/>
-          </a:p>
-        </p:txBody>
-      </p:sp>
-    </p:spTree>
-    <p:extLst>
-      <p:ext uri="{BB962C8B-B14F-4D97-AF65-F5344CB8AC3E}">
-        <p14:creationId xmlns:p14="http://schemas.microsoft.com/office/powerpoint/2010/main" val="2813769766"/>
-      </p:ext>
-    </p:extLst>
-  </p:cSld>
-  <p:clrMapOvr>
-    <a:masterClrMapping/>
-  </p:clrMapOvr>
-  <p:timing>
-    <p:tnLst>
-      <p:par>
-        <p:cTn id="1" dur="indefinite" restart="never" nodeType="tmRoot"/>
-      </p:par>
-    </p:tnLst>
-  </p:timing>
-</p:sld>
-</file>
-
-<file path=ppt/slides/slide22.xml><?xml version="1.0" encoding="utf-8"?>
-<p:sld xmlns:a="http://schemas.openxmlformats.org/drawingml/2006/main" xmlns:r="http://schemas.openxmlformats.org/officeDocument/2006/relationships" xmlns:p="http://schemas.openxmlformats.org/presentationml/2006/main">
-  <p:cSld>
-    <p:spTree>
-      <p:nvGrpSpPr>
-        <p:cNvPr id="1" name=""/>
-        <p:cNvGrpSpPr/>
-        <p:nvPr/>
-      </p:nvGrpSpPr>
-      <p:grpSpPr>
-        <a:xfrm>
-          <a:off x="0" y="0"/>
-          <a:ext cx="0" cy="0"/>
-          <a:chOff x="0" y="0"/>
-          <a:chExt cx="0" cy="0"/>
-        </a:xfrm>
-      </p:grpSpPr>
-      <p:sp>
-        <p:nvSpPr>
-          <p:cNvPr id="2" name="Content Placeholder 1"/>
-          <p:cNvSpPr>
-            <a:spLocks noGrp="1"/>
-          </p:cNvSpPr>
-          <p:nvPr>
-            <p:ph idx="1"/>
-          </p:nvPr>
-        </p:nvSpPr>
-        <p:spPr/>
-        <p:txBody>
-          <a:bodyPr/>
-          <a:lstStyle/>
-          <a:p>
-            <a:r>
-              <a:rPr lang="en-GB" dirty="0" smtClean="0"/>
               <a:t>Placket-</a:t>
             </a:r>
             <a:r>
@@ -7578,7 +7394,7 @@
 </p:sld>
 </file>
 
-<file path=ppt/slides/slide23.xml><?xml version="1.0" encoding="utf-8"?>
+<file path=ppt/slides/slide21.xml><?xml version="1.0" encoding="utf-8"?>
 <p:sld xmlns:a="http://schemas.openxmlformats.org/drawingml/2006/main" xmlns:r="http://schemas.openxmlformats.org/officeDocument/2006/relationships" xmlns:p="http://schemas.openxmlformats.org/presentationml/2006/main">
   <p:cSld>
     <p:spTree>
@@ -7686,7 +7502,7 @@
 </p:sld>
 </file>
 
-<file path=ppt/slides/slide24.xml><?xml version="1.0" encoding="utf-8"?>
+<file path=ppt/slides/slide22.xml><?xml version="1.0" encoding="utf-8"?>
 <p:sld xmlns:a="http://schemas.openxmlformats.org/drawingml/2006/main" xmlns:r="http://schemas.openxmlformats.org/officeDocument/2006/relationships" xmlns:p="http://schemas.openxmlformats.org/presentationml/2006/main">
   <p:cSld>
     <p:spTree>
@@ -7794,7 +7610,7 @@
 </p:sld>
 </file>
 
-<file path=ppt/slides/slide25.xml><?xml version="1.0" encoding="utf-8"?>
+<file path=ppt/slides/slide23.xml><?xml version="1.0" encoding="utf-8"?>
 <p:sld xmlns:a="http://schemas.openxmlformats.org/drawingml/2006/main" xmlns:r="http://schemas.openxmlformats.org/officeDocument/2006/relationships" xmlns:p="http://schemas.openxmlformats.org/presentationml/2006/main">
   <p:cSld>
     <p:spTree>
@@ -7860,7 +7676,7 @@
 </p:sld>
 </file>
 
-<file path=ppt/slides/slide26.xml><?xml version="1.0" encoding="utf-8"?>
+<file path=ppt/slides/slide24.xml><?xml version="1.0" encoding="utf-8"?>
 <p:sld xmlns:a="http://schemas.openxmlformats.org/drawingml/2006/main" xmlns:r="http://schemas.openxmlformats.org/officeDocument/2006/relationships" xmlns:p="http://schemas.openxmlformats.org/presentationml/2006/main">
   <p:cSld>
     <p:spTree>
@@ -7926,7 +7742,7 @@
 </p:sld>
 </file>
 
-<file path=ppt/slides/slide27.xml><?xml version="1.0" encoding="utf-8"?>
+<file path=ppt/slides/slide25.xml><?xml version="1.0" encoding="utf-8"?>
 <p:sld xmlns:a="http://schemas.openxmlformats.org/drawingml/2006/main" xmlns:r="http://schemas.openxmlformats.org/officeDocument/2006/relationships" xmlns:p="http://schemas.openxmlformats.org/presentationml/2006/main">
   <p:cSld>
     <p:spTree>
@@ -7992,7 +7808,7 @@
 </p:sld>
 </file>
 
-<file path=ppt/slides/slide28.xml><?xml version="1.0" encoding="utf-8"?>
+<file path=ppt/slides/slide26.xml><?xml version="1.0" encoding="utf-8"?>
 <p:sld xmlns:a="http://schemas.openxmlformats.org/drawingml/2006/main" xmlns:r="http://schemas.openxmlformats.org/officeDocument/2006/relationships" xmlns:p="http://schemas.openxmlformats.org/presentationml/2006/main">
   <p:cSld>
     <p:spTree>
@@ -8197,7 +8013,7 @@
 </p:sld>
 </file>
 
-<file path=ppt/slides/slide29.xml><?xml version="1.0" encoding="utf-8"?>
+<file path=ppt/slides/slide27.xml><?xml version="1.0" encoding="utf-8"?>
 <p:sld xmlns:a="http://schemas.openxmlformats.org/drawingml/2006/main" xmlns:r="http://schemas.openxmlformats.org/officeDocument/2006/relationships" xmlns:p="http://schemas.openxmlformats.org/presentationml/2006/main">
   <p:cSld>
     <p:spTree>

</xml_diff>